<commit_message>
few changes (just ignore them for now)
</commit_message>
<xml_diff>
--- a/project_slides.pptx
+++ b/project_slides.pptx
@@ -7,8 +7,16 @@
   <p:sldIdLst>
     <p:sldId id="256" r:id="rId2"/>
     <p:sldId id="257" r:id="rId3"/>
-    <p:sldId id="258" r:id="rId4"/>
-    <p:sldId id="259" r:id="rId5"/>
+    <p:sldId id="264" r:id="rId4"/>
+    <p:sldId id="265" r:id="rId5"/>
+    <p:sldId id="266" r:id="rId6"/>
+    <p:sldId id="267" r:id="rId7"/>
+    <p:sldId id="263" r:id="rId8"/>
+    <p:sldId id="260" r:id="rId9"/>
+    <p:sldId id="258" r:id="rId10"/>
+    <p:sldId id="261" r:id="rId11"/>
+    <p:sldId id="262" r:id="rId12"/>
+    <p:sldId id="259" r:id="rId13"/>
   </p:sldIdLst>
   <p:sldSz cx="12192000" cy="6858000"/>
   <p:notesSz cx="6858000" cy="9144000"/>
@@ -107,6 +115,11 @@
       </a:defRPr>
     </a:lvl9pPr>
   </p:defaultTextStyle>
+  <p:extLst>
+    <p:ext uri="{EFAFB233-063F-42B5-8137-9DF3F51BA10A}">
+      <p15:sldGuideLst xmlns:p15="http://schemas.microsoft.com/office/powerpoint/2012/main"/>
+    </p:ext>
+  </p:extLst>
 </p:presentation>
 </file>
 
@@ -114,8 +127,8 @@
 <pc:chgInfo xmlns:a="http://schemas.openxmlformats.org/drawingml/2006/main" xmlns:r="http://schemas.openxmlformats.org/officeDocument/2006/relationships" xmlns:ac="http://schemas.microsoft.com/office/drawing/2013/main/command" xmlns:pc="http://schemas.microsoft.com/office/powerpoint/2013/main/command">
   <pc:docChgLst>
     <pc:chgData name="Anas Bahtaoui" userId="db706f47-a583-4f79-9110-0cf74ddba288" providerId="ADAL" clId="{16185F57-DD46-4EB0-A674-04531E5E68B3}"/>
-    <pc:docChg chg="addSld modSld">
-      <pc:chgData name="Anas Bahtaoui" userId="db706f47-a583-4f79-9110-0cf74ddba288" providerId="ADAL" clId="{16185F57-DD46-4EB0-A674-04531E5E68B3}" dt="2022-04-24T02:44:28.303" v="110" actId="20577"/>
+    <pc:docChg chg="undo custSel addSld modSld">
+      <pc:chgData name="Anas Bahtaoui" userId="db706f47-a583-4f79-9110-0cf74ddba288" providerId="ADAL" clId="{16185F57-DD46-4EB0-A674-04531E5E68B3}" dt="2022-04-25T16:43:42.953" v="788"/>
       <pc:docMkLst>
         <pc:docMk/>
       </pc:docMkLst>
@@ -134,33 +147,121 @@
           </ac:spMkLst>
         </pc:spChg>
       </pc:sldChg>
-      <pc:sldChg chg="modSp new mod">
-        <pc:chgData name="Anas Bahtaoui" userId="db706f47-a583-4f79-9110-0cf74ddba288" providerId="ADAL" clId="{16185F57-DD46-4EB0-A674-04531E5E68B3}" dt="2022-04-24T02:42:53.313" v="37" actId="20577"/>
+      <pc:sldChg chg="addSp delSp modSp new mod setBg">
+        <pc:chgData name="Anas Bahtaoui" userId="db706f47-a583-4f79-9110-0cf74ddba288" providerId="ADAL" clId="{16185F57-DD46-4EB0-A674-04531E5E68B3}" dt="2022-04-25T16:38:37.900" v="779" actId="20577"/>
         <pc:sldMkLst>
           <pc:docMk/>
           <pc:sldMk cId="3958296631" sldId="257"/>
         </pc:sldMkLst>
         <pc:spChg chg="mod">
-          <ac:chgData name="Anas Bahtaoui" userId="db706f47-a583-4f79-9110-0cf74ddba288" providerId="ADAL" clId="{16185F57-DD46-4EB0-A674-04531E5E68B3}" dt="2022-04-24T02:42:53.313" v="37" actId="20577"/>
+          <ac:chgData name="Anas Bahtaoui" userId="db706f47-a583-4f79-9110-0cf74ddba288" providerId="ADAL" clId="{16185F57-DD46-4EB0-A674-04531E5E68B3}" dt="2022-04-25T16:35:07.858" v="327" actId="26606"/>
           <ac:spMkLst>
             <pc:docMk/>
             <pc:sldMk cId="3958296631" sldId="257"/>
             <ac:spMk id="2" creationId="{6A03154C-0875-45B5-8F24-31898320100B}"/>
           </ac:spMkLst>
         </pc:spChg>
+        <pc:spChg chg="mod ord">
+          <ac:chgData name="Anas Bahtaoui" userId="db706f47-a583-4f79-9110-0cf74ddba288" providerId="ADAL" clId="{16185F57-DD46-4EB0-A674-04531E5E68B3}" dt="2022-04-25T16:38:37.900" v="779" actId="20577"/>
+          <ac:spMkLst>
+            <pc:docMk/>
+            <pc:sldMk cId="3958296631" sldId="257"/>
+            <ac:spMk id="3" creationId="{8B1557F2-F9E4-4A9A-BD5E-B134757FB06D}"/>
+          </ac:spMkLst>
+        </pc:spChg>
+        <pc:spChg chg="add del">
+          <ac:chgData name="Anas Bahtaoui" userId="db706f47-a583-4f79-9110-0cf74ddba288" providerId="ADAL" clId="{16185F57-DD46-4EB0-A674-04531E5E68B3}" dt="2022-04-25T16:35:07.858" v="327" actId="26606"/>
+          <ac:spMkLst>
+            <pc:docMk/>
+            <pc:sldMk cId="3958296631" sldId="257"/>
+            <ac:spMk id="10" creationId="{2B97F24A-32CE-4C1C-A50D-3016B394DCFB}"/>
+          </ac:spMkLst>
+        </pc:spChg>
+        <pc:spChg chg="add del">
+          <ac:chgData name="Anas Bahtaoui" userId="db706f47-a583-4f79-9110-0cf74ddba288" providerId="ADAL" clId="{16185F57-DD46-4EB0-A674-04531E5E68B3}" dt="2022-04-25T16:35:07.858" v="327" actId="26606"/>
+          <ac:spMkLst>
+            <pc:docMk/>
+            <pc:sldMk cId="3958296631" sldId="257"/>
+            <ac:spMk id="12" creationId="{CD8B4F24-440B-49E9-B85D-733523DC064B}"/>
+          </ac:spMkLst>
+        </pc:spChg>
+        <pc:spChg chg="add del">
+          <ac:chgData name="Anas Bahtaoui" userId="db706f47-a583-4f79-9110-0cf74ddba288" providerId="ADAL" clId="{16185F57-DD46-4EB0-A674-04531E5E68B3}" dt="2022-04-25T16:35:07.837" v="326" actId="26606"/>
+          <ac:spMkLst>
+            <pc:docMk/>
+            <pc:sldMk cId="3958296631" sldId="257"/>
+            <ac:spMk id="17" creationId="{2B566528-1B12-4246-9431-5C2D7D081168}"/>
+          </ac:spMkLst>
+        </pc:spChg>
+        <pc:spChg chg="add">
+          <ac:chgData name="Anas Bahtaoui" userId="db706f47-a583-4f79-9110-0cf74ddba288" providerId="ADAL" clId="{16185F57-DD46-4EB0-A674-04531E5E68B3}" dt="2022-04-25T16:35:07.858" v="327" actId="26606"/>
+          <ac:spMkLst>
+            <pc:docMk/>
+            <pc:sldMk cId="3958296631" sldId="257"/>
+            <ac:spMk id="27" creationId="{2B566528-1B12-4246-9431-5C2D7D081168}"/>
+          </ac:spMkLst>
+        </pc:spChg>
+        <pc:grpChg chg="add del">
+          <ac:chgData name="Anas Bahtaoui" userId="db706f47-a583-4f79-9110-0cf74ddba288" providerId="ADAL" clId="{16185F57-DD46-4EB0-A674-04531E5E68B3}" dt="2022-04-25T16:35:07.837" v="326" actId="26606"/>
+          <ac:grpSpMkLst>
+            <pc:docMk/>
+            <pc:sldMk cId="3958296631" sldId="257"/>
+            <ac:grpSpMk id="19" creationId="{828A5161-06F1-46CF-8AD7-844680A59E13}"/>
+          </ac:grpSpMkLst>
+        </pc:grpChg>
+        <pc:grpChg chg="add del">
+          <ac:chgData name="Anas Bahtaoui" userId="db706f47-a583-4f79-9110-0cf74ddba288" providerId="ADAL" clId="{16185F57-DD46-4EB0-A674-04531E5E68B3}" dt="2022-04-25T16:35:07.837" v="326" actId="26606"/>
+          <ac:grpSpMkLst>
+            <pc:docMk/>
+            <pc:sldMk cId="3958296631" sldId="257"/>
+            <ac:grpSpMk id="23" creationId="{5995D10D-E9C9-47DB-AE7E-801FEF38F5C9}"/>
+          </ac:grpSpMkLst>
+        </pc:grpChg>
+        <pc:grpChg chg="add">
+          <ac:chgData name="Anas Bahtaoui" userId="db706f47-a583-4f79-9110-0cf74ddba288" providerId="ADAL" clId="{16185F57-DD46-4EB0-A674-04531E5E68B3}" dt="2022-04-25T16:35:07.858" v="327" actId="26606"/>
+          <ac:grpSpMkLst>
+            <pc:docMk/>
+            <pc:sldMk cId="3958296631" sldId="257"/>
+            <ac:grpSpMk id="28" creationId="{287F69AB-2350-44E3-9076-00265B93F313}"/>
+          </ac:grpSpMkLst>
+        </pc:grpChg>
+        <pc:grpChg chg="add">
+          <ac:chgData name="Anas Bahtaoui" userId="db706f47-a583-4f79-9110-0cf74ddba288" providerId="ADAL" clId="{16185F57-DD46-4EB0-A674-04531E5E68B3}" dt="2022-04-25T16:35:07.858" v="327" actId="26606"/>
+          <ac:grpSpMkLst>
+            <pc:docMk/>
+            <pc:sldMk cId="3958296631" sldId="257"/>
+            <ac:grpSpMk id="31" creationId="{3EA7D759-6BEF-4CBD-A325-BCFA77832B3F}"/>
+          </ac:grpSpMkLst>
+        </pc:grpChg>
+        <pc:picChg chg="add mod">
+          <ac:chgData name="Anas Bahtaoui" userId="db706f47-a583-4f79-9110-0cf74ddba288" providerId="ADAL" clId="{16185F57-DD46-4EB0-A674-04531E5E68B3}" dt="2022-04-25T16:35:07.858" v="327" actId="26606"/>
+          <ac:picMkLst>
+            <pc:docMk/>
+            <pc:sldMk cId="3958296631" sldId="257"/>
+            <ac:picMk id="5" creationId="{D5B67FC0-ADD5-4205-AE92-739A399C6483}"/>
+          </ac:picMkLst>
+        </pc:picChg>
       </pc:sldChg>
       <pc:sldChg chg="modSp new mod">
-        <pc:chgData name="Anas Bahtaoui" userId="db706f47-a583-4f79-9110-0cf74ddba288" providerId="ADAL" clId="{16185F57-DD46-4EB0-A674-04531E5E68B3}" dt="2022-04-24T02:43:06.719" v="59" actId="20577"/>
+        <pc:chgData name="Anas Bahtaoui" userId="db706f47-a583-4f79-9110-0cf74ddba288" providerId="ADAL" clId="{16185F57-DD46-4EB0-A674-04531E5E68B3}" dt="2022-04-25T16:10:59.896" v="240" actId="20577"/>
         <pc:sldMkLst>
           <pc:docMk/>
           <pc:sldMk cId="535354618" sldId="258"/>
         </pc:sldMkLst>
         <pc:spChg chg="mod">
-          <ac:chgData name="Anas Bahtaoui" userId="db706f47-a583-4f79-9110-0cf74ddba288" providerId="ADAL" clId="{16185F57-DD46-4EB0-A674-04531E5E68B3}" dt="2022-04-24T02:43:06.719" v="59" actId="20577"/>
+          <ac:chgData name="Anas Bahtaoui" userId="db706f47-a583-4f79-9110-0cf74ddba288" providerId="ADAL" clId="{16185F57-DD46-4EB0-A674-04531E5E68B3}" dt="2022-04-25T16:05:20.694" v="136"/>
           <ac:spMkLst>
             <pc:docMk/>
             <pc:sldMk cId="535354618" sldId="258"/>
             <ac:spMk id="2" creationId="{81EF4448-BDBE-429C-BDDD-6E410B431A0C}"/>
+          </ac:spMkLst>
+        </pc:spChg>
+        <pc:spChg chg="mod">
+          <ac:chgData name="Anas Bahtaoui" userId="db706f47-a583-4f79-9110-0cf74ddba288" providerId="ADAL" clId="{16185F57-DD46-4EB0-A674-04531E5E68B3}" dt="2022-04-25T16:10:59.896" v="240" actId="20577"/>
+          <ac:spMkLst>
+            <pc:docMk/>
+            <pc:sldMk cId="535354618" sldId="258"/>
+            <ac:spMk id="3" creationId="{8B6C581B-EBD2-4B22-81D7-3E4EA42F5D29}"/>
           </ac:spMkLst>
         </pc:spChg>
       </pc:sldChg>
@@ -176,6 +277,134 @@
             <pc:docMk/>
             <pc:sldMk cId="147077479" sldId="259"/>
             <ac:spMk id="2" creationId="{DF00E9FC-9A84-4C2B-A8ED-2259FEE7C6A8}"/>
+          </ac:spMkLst>
+        </pc:spChg>
+      </pc:sldChg>
+      <pc:sldChg chg="modSp new mod">
+        <pc:chgData name="Anas Bahtaoui" userId="db706f47-a583-4f79-9110-0cf74ddba288" providerId="ADAL" clId="{16185F57-DD46-4EB0-A674-04531E5E68B3}" dt="2022-04-25T16:05:10.004" v="135" actId="20577"/>
+        <pc:sldMkLst>
+          <pc:docMk/>
+          <pc:sldMk cId="3337437340" sldId="260"/>
+        </pc:sldMkLst>
+        <pc:spChg chg="mod">
+          <ac:chgData name="Anas Bahtaoui" userId="db706f47-a583-4f79-9110-0cf74ddba288" providerId="ADAL" clId="{16185F57-DD46-4EB0-A674-04531E5E68B3}" dt="2022-04-25T16:05:10.004" v="135" actId="20577"/>
+          <ac:spMkLst>
+            <pc:docMk/>
+            <pc:sldMk cId="3337437340" sldId="260"/>
+            <ac:spMk id="2" creationId="{48D16E36-38E8-4453-AE2D-FE0B37D4E9BF}"/>
+          </ac:spMkLst>
+        </pc:spChg>
+      </pc:sldChg>
+      <pc:sldChg chg="modSp new mod">
+        <pc:chgData name="Anas Bahtaoui" userId="db706f47-a583-4f79-9110-0cf74ddba288" providerId="ADAL" clId="{16185F57-DD46-4EB0-A674-04531E5E68B3}" dt="2022-04-25T16:07:24.310" v="193" actId="5793"/>
+        <pc:sldMkLst>
+          <pc:docMk/>
+          <pc:sldMk cId="2420648934" sldId="261"/>
+        </pc:sldMkLst>
+        <pc:spChg chg="mod">
+          <ac:chgData name="Anas Bahtaoui" userId="db706f47-a583-4f79-9110-0cf74ddba288" providerId="ADAL" clId="{16185F57-DD46-4EB0-A674-04531E5E68B3}" dt="2022-04-25T16:06:09.493" v="170" actId="113"/>
+          <ac:spMkLst>
+            <pc:docMk/>
+            <pc:sldMk cId="2420648934" sldId="261"/>
+            <ac:spMk id="2" creationId="{8333C7ED-42AE-40F0-A761-E6F2DCB2B1DB}"/>
+          </ac:spMkLst>
+        </pc:spChg>
+        <pc:spChg chg="mod">
+          <ac:chgData name="Anas Bahtaoui" userId="db706f47-a583-4f79-9110-0cf74ddba288" providerId="ADAL" clId="{16185F57-DD46-4EB0-A674-04531E5E68B3}" dt="2022-04-25T16:07:24.310" v="193" actId="5793"/>
+          <ac:spMkLst>
+            <pc:docMk/>
+            <pc:sldMk cId="2420648934" sldId="261"/>
+            <ac:spMk id="3" creationId="{82A3D754-3830-4B9C-BF45-FDF6C0229835}"/>
+          </ac:spMkLst>
+        </pc:spChg>
+      </pc:sldChg>
+      <pc:sldChg chg="modSp new mod">
+        <pc:chgData name="Anas Bahtaoui" userId="db706f47-a583-4f79-9110-0cf74ddba288" providerId="ADAL" clId="{16185F57-DD46-4EB0-A674-04531E5E68B3}" dt="2022-04-25T16:06:36.818" v="188" actId="113"/>
+        <pc:sldMkLst>
+          <pc:docMk/>
+          <pc:sldMk cId="527354009" sldId="262"/>
+        </pc:sldMkLst>
+        <pc:spChg chg="mod">
+          <ac:chgData name="Anas Bahtaoui" userId="db706f47-a583-4f79-9110-0cf74ddba288" providerId="ADAL" clId="{16185F57-DD46-4EB0-A674-04531E5E68B3}" dt="2022-04-25T16:06:36.818" v="188" actId="113"/>
+          <ac:spMkLst>
+            <pc:docMk/>
+            <pc:sldMk cId="527354009" sldId="262"/>
+            <ac:spMk id="2" creationId="{9790D072-325E-4DDC-8A6C-5BDB183236F0}"/>
+          </ac:spMkLst>
+        </pc:spChg>
+      </pc:sldChg>
+      <pc:sldChg chg="modSp new mod">
+        <pc:chgData name="Anas Bahtaoui" userId="db706f47-a583-4f79-9110-0cf74ddba288" providerId="ADAL" clId="{16185F57-DD46-4EB0-A674-04531E5E68B3}" dt="2022-04-25T16:07:49.142" v="198" actId="20577"/>
+        <pc:sldMkLst>
+          <pc:docMk/>
+          <pc:sldMk cId="1501144360" sldId="263"/>
+        </pc:sldMkLst>
+        <pc:spChg chg="mod">
+          <ac:chgData name="Anas Bahtaoui" userId="db706f47-a583-4f79-9110-0cf74ddba288" providerId="ADAL" clId="{16185F57-DD46-4EB0-A674-04531E5E68B3}" dt="2022-04-25T16:07:49.142" v="198" actId="20577"/>
+          <ac:spMkLst>
+            <pc:docMk/>
+            <pc:sldMk cId="1501144360" sldId="263"/>
+            <ac:spMk id="3" creationId="{99C7ECA6-E451-4D5E-8A69-72671A63C204}"/>
+          </ac:spMkLst>
+        </pc:spChg>
+      </pc:sldChg>
+      <pc:sldChg chg="modSp new mod">
+        <pc:chgData name="Anas Bahtaoui" userId="db706f47-a583-4f79-9110-0cf74ddba288" providerId="ADAL" clId="{16185F57-DD46-4EB0-A674-04531E5E68B3}" dt="2022-04-25T16:41:11.601" v="782" actId="27636"/>
+        <pc:sldMkLst>
+          <pc:docMk/>
+          <pc:sldMk cId="193435394" sldId="264"/>
+        </pc:sldMkLst>
+        <pc:spChg chg="mod">
+          <ac:chgData name="Anas Bahtaoui" userId="db706f47-a583-4f79-9110-0cf74ddba288" providerId="ADAL" clId="{16185F57-DD46-4EB0-A674-04531E5E68B3}" dt="2022-04-25T16:41:11.601" v="782" actId="27636"/>
+          <ac:spMkLst>
+            <pc:docMk/>
+            <pc:sldMk cId="193435394" sldId="264"/>
+            <ac:spMk id="3" creationId="{2B9FFDFF-683B-4D43-AAA9-B71E67ACFAAD}"/>
+          </ac:spMkLst>
+        </pc:spChg>
+      </pc:sldChg>
+      <pc:sldChg chg="modSp new mod">
+        <pc:chgData name="Anas Bahtaoui" userId="db706f47-a583-4f79-9110-0cf74ddba288" providerId="ADAL" clId="{16185F57-DD46-4EB0-A674-04531E5E68B3}" dt="2022-04-25T16:42:20.761" v="784"/>
+        <pc:sldMkLst>
+          <pc:docMk/>
+          <pc:sldMk cId="194705878" sldId="265"/>
+        </pc:sldMkLst>
+        <pc:spChg chg="mod">
+          <ac:chgData name="Anas Bahtaoui" userId="db706f47-a583-4f79-9110-0cf74ddba288" providerId="ADAL" clId="{16185F57-DD46-4EB0-A674-04531E5E68B3}" dt="2022-04-25T16:42:20.761" v="784"/>
+          <ac:spMkLst>
+            <pc:docMk/>
+            <pc:sldMk cId="194705878" sldId="265"/>
+            <ac:spMk id="3" creationId="{AB3A2C85-5DD5-40AD-898C-A0E657267DB6}"/>
+          </ac:spMkLst>
+        </pc:spChg>
+      </pc:sldChg>
+      <pc:sldChg chg="modSp new mod">
+        <pc:chgData name="Anas Bahtaoui" userId="db706f47-a583-4f79-9110-0cf74ddba288" providerId="ADAL" clId="{16185F57-DD46-4EB0-A674-04531E5E68B3}" dt="2022-04-25T16:42:55.678" v="786"/>
+        <pc:sldMkLst>
+          <pc:docMk/>
+          <pc:sldMk cId="3485025798" sldId="266"/>
+        </pc:sldMkLst>
+        <pc:spChg chg="mod">
+          <ac:chgData name="Anas Bahtaoui" userId="db706f47-a583-4f79-9110-0cf74ddba288" providerId="ADAL" clId="{16185F57-DD46-4EB0-A674-04531E5E68B3}" dt="2022-04-25T16:42:55.678" v="786"/>
+          <ac:spMkLst>
+            <pc:docMk/>
+            <pc:sldMk cId="3485025798" sldId="266"/>
+            <ac:spMk id="3" creationId="{D16A455B-7B8F-4220-AB85-8784EF02DA8C}"/>
+          </ac:spMkLst>
+        </pc:spChg>
+      </pc:sldChg>
+      <pc:sldChg chg="modSp new mod">
+        <pc:chgData name="Anas Bahtaoui" userId="db706f47-a583-4f79-9110-0cf74ddba288" providerId="ADAL" clId="{16185F57-DD46-4EB0-A674-04531E5E68B3}" dt="2022-04-25T16:43:42.953" v="788"/>
+        <pc:sldMkLst>
+          <pc:docMk/>
+          <pc:sldMk cId="1384759136" sldId="267"/>
+        </pc:sldMkLst>
+        <pc:spChg chg="mod">
+          <ac:chgData name="Anas Bahtaoui" userId="db706f47-a583-4f79-9110-0cf74ddba288" providerId="ADAL" clId="{16185F57-DD46-4EB0-A674-04531E5E68B3}" dt="2022-04-25T16:43:42.953" v="788"/>
+          <ac:spMkLst>
+            <pc:docMk/>
+            <pc:sldMk cId="1384759136" sldId="267"/>
+            <ac:spMk id="3" creationId="{1729431B-A04B-4C88-B96F-B1FFE28C1C41}"/>
           </ac:spMkLst>
         </pc:spChg>
       </pc:sldChg>
@@ -333,7 +562,7 @@
           <a:p>
             <a:fld id="{43566339-5A7A-4BE9-9D74-E09361E50C44}" type="datetimeFigureOut">
               <a:rPr lang="it-IT" smtClean="0"/>
-              <a:t>24/04/2022</a:t>
+              <a:t>25/04/2022</a:t>
             </a:fld>
             <a:endParaRPr lang="it-IT"/>
           </a:p>
@@ -533,7 +762,7 @@
           <a:p>
             <a:fld id="{43566339-5A7A-4BE9-9D74-E09361E50C44}" type="datetimeFigureOut">
               <a:rPr lang="it-IT" smtClean="0"/>
-              <a:t>24/04/2022</a:t>
+              <a:t>25/04/2022</a:t>
             </a:fld>
             <a:endParaRPr lang="it-IT"/>
           </a:p>
@@ -743,7 +972,7 @@
           <a:p>
             <a:fld id="{43566339-5A7A-4BE9-9D74-E09361E50C44}" type="datetimeFigureOut">
               <a:rPr lang="it-IT" smtClean="0"/>
-              <a:t>24/04/2022</a:t>
+              <a:t>25/04/2022</a:t>
             </a:fld>
             <a:endParaRPr lang="it-IT"/>
           </a:p>
@@ -943,7 +1172,7 @@
           <a:p>
             <a:fld id="{43566339-5A7A-4BE9-9D74-E09361E50C44}" type="datetimeFigureOut">
               <a:rPr lang="it-IT" smtClean="0"/>
-              <a:t>24/04/2022</a:t>
+              <a:t>25/04/2022</a:t>
             </a:fld>
             <a:endParaRPr lang="it-IT"/>
           </a:p>
@@ -1219,7 +1448,7 @@
           <a:p>
             <a:fld id="{43566339-5A7A-4BE9-9D74-E09361E50C44}" type="datetimeFigureOut">
               <a:rPr lang="it-IT" smtClean="0"/>
-              <a:t>24/04/2022</a:t>
+              <a:t>25/04/2022</a:t>
             </a:fld>
             <a:endParaRPr lang="it-IT"/>
           </a:p>
@@ -1487,7 +1716,7 @@
           <a:p>
             <a:fld id="{43566339-5A7A-4BE9-9D74-E09361E50C44}" type="datetimeFigureOut">
               <a:rPr lang="it-IT" smtClean="0"/>
-              <a:t>24/04/2022</a:t>
+              <a:t>25/04/2022</a:t>
             </a:fld>
             <a:endParaRPr lang="it-IT"/>
           </a:p>
@@ -1902,7 +2131,7 @@
           <a:p>
             <a:fld id="{43566339-5A7A-4BE9-9D74-E09361E50C44}" type="datetimeFigureOut">
               <a:rPr lang="it-IT" smtClean="0"/>
-              <a:t>24/04/2022</a:t>
+              <a:t>25/04/2022</a:t>
             </a:fld>
             <a:endParaRPr lang="it-IT"/>
           </a:p>
@@ -2044,7 +2273,7 @@
           <a:p>
             <a:fld id="{43566339-5A7A-4BE9-9D74-E09361E50C44}" type="datetimeFigureOut">
               <a:rPr lang="it-IT" smtClean="0"/>
-              <a:t>24/04/2022</a:t>
+              <a:t>25/04/2022</a:t>
             </a:fld>
             <a:endParaRPr lang="it-IT"/>
           </a:p>
@@ -2157,7 +2386,7 @@
           <a:p>
             <a:fld id="{43566339-5A7A-4BE9-9D74-E09361E50C44}" type="datetimeFigureOut">
               <a:rPr lang="it-IT" smtClean="0"/>
-              <a:t>24/04/2022</a:t>
+              <a:t>25/04/2022</a:t>
             </a:fld>
             <a:endParaRPr lang="it-IT"/>
           </a:p>
@@ -2470,7 +2699,7 @@
           <a:p>
             <a:fld id="{43566339-5A7A-4BE9-9D74-E09361E50C44}" type="datetimeFigureOut">
               <a:rPr lang="it-IT" smtClean="0"/>
-              <a:t>24/04/2022</a:t>
+              <a:t>25/04/2022</a:t>
             </a:fld>
             <a:endParaRPr lang="it-IT"/>
           </a:p>
@@ -2759,7 +2988,7 @@
           <a:p>
             <a:fld id="{43566339-5A7A-4BE9-9D74-E09361E50C44}" type="datetimeFigureOut">
               <a:rPr lang="it-IT" smtClean="0"/>
-              <a:t>24/04/2022</a:t>
+              <a:t>25/04/2022</a:t>
             </a:fld>
             <a:endParaRPr lang="it-IT"/>
           </a:p>
@@ -3002,7 +3231,7 @@
           <a:p>
             <a:fld id="{43566339-5A7A-4BE9-9D74-E09361E50C44}" type="datetimeFigureOut">
               <a:rPr lang="it-IT" smtClean="0"/>
-              <a:t>24/04/2022</a:t>
+              <a:t>25/04/2022</a:t>
             </a:fld>
             <a:endParaRPr lang="it-IT"/>
           </a:p>
@@ -3486,7 +3715,7 @@
 </p:sld>
 </file>
 
-<file path=ppt/slides/slide2.xml><?xml version="1.0" encoding="utf-8"?>
+<file path=ppt/slides/slide10.xml><?xml version="1.0" encoding="utf-8"?>
 <p:sld xmlns:a="http://schemas.openxmlformats.org/drawingml/2006/main" xmlns:r="http://schemas.openxmlformats.org/officeDocument/2006/relationships" xmlns:p="http://schemas.openxmlformats.org/presentationml/2006/main">
   <p:cSld>
     <p:spTree>
@@ -3508,6 +3737,489 @@
           <p:cNvPr id="2" name="Title 1">
             <a:extLst>
               <a:ext uri="{FF2B5EF4-FFF2-40B4-BE49-F238E27FC236}">
+                <a16:creationId xmlns:a16="http://schemas.microsoft.com/office/drawing/2014/main" id="{8333C7ED-42AE-40F0-A761-E6F2DCB2B1DB}"/>
+              </a:ext>
+            </a:extLst>
+          </p:cNvPr>
+          <p:cNvSpPr>
+            <a:spLocks noGrp="1"/>
+          </p:cNvSpPr>
+          <p:nvPr>
+            <p:ph type="title"/>
+          </p:nvPr>
+        </p:nvSpPr>
+        <p:spPr/>
+        <p:txBody>
+          <a:bodyPr/>
+          <a:lstStyle/>
+          <a:p>
+            <a:r>
+              <a:rPr lang="en-US" b="1" dirty="0"/>
+              <a:t>Probability distributions</a:t>
+            </a:r>
+            <a:endParaRPr lang="it-IT" b="1" dirty="0"/>
+          </a:p>
+        </p:txBody>
+      </p:sp>
+      <p:sp>
+        <p:nvSpPr>
+          <p:cNvPr id="3" name="Content Placeholder 2">
+            <a:extLst>
+              <a:ext uri="{FF2B5EF4-FFF2-40B4-BE49-F238E27FC236}">
+                <a16:creationId xmlns:a16="http://schemas.microsoft.com/office/drawing/2014/main" id="{82A3D754-3830-4B9C-BF45-FDF6C0229835}"/>
+              </a:ext>
+            </a:extLst>
+          </p:cNvPr>
+          <p:cNvSpPr>
+            <a:spLocks noGrp="1"/>
+          </p:cNvSpPr>
+          <p:nvPr>
+            <p:ph idx="1"/>
+          </p:nvPr>
+        </p:nvSpPr>
+        <p:spPr/>
+        <p:txBody>
+          <a:bodyPr/>
+          <a:lstStyle/>
+          <a:p>
+            <a:endParaRPr lang="it-IT" dirty="0"/>
+          </a:p>
+        </p:txBody>
+      </p:sp>
+    </p:spTree>
+    <p:extLst>
+      <p:ext uri="{BB962C8B-B14F-4D97-AF65-F5344CB8AC3E}">
+        <p14:creationId xmlns:p14="http://schemas.microsoft.com/office/powerpoint/2010/main" val="2420648934"/>
+      </p:ext>
+    </p:extLst>
+  </p:cSld>
+  <p:clrMapOvr>
+    <a:masterClrMapping/>
+  </p:clrMapOvr>
+</p:sld>
+</file>
+
+<file path=ppt/slides/slide11.xml><?xml version="1.0" encoding="utf-8"?>
+<p:sld xmlns:a="http://schemas.openxmlformats.org/drawingml/2006/main" xmlns:r="http://schemas.openxmlformats.org/officeDocument/2006/relationships" xmlns:p="http://schemas.openxmlformats.org/presentationml/2006/main">
+  <p:cSld>
+    <p:spTree>
+      <p:nvGrpSpPr>
+        <p:cNvPr id="1" name=""/>
+        <p:cNvGrpSpPr/>
+        <p:nvPr/>
+      </p:nvGrpSpPr>
+      <p:grpSpPr>
+        <a:xfrm>
+          <a:off x="0" y="0"/>
+          <a:ext cx="0" cy="0"/>
+          <a:chOff x="0" y="0"/>
+          <a:chExt cx="0" cy="0"/>
+        </a:xfrm>
+      </p:grpSpPr>
+      <p:sp>
+        <p:nvSpPr>
+          <p:cNvPr id="2" name="Title 1">
+            <a:extLst>
+              <a:ext uri="{FF2B5EF4-FFF2-40B4-BE49-F238E27FC236}">
+                <a16:creationId xmlns:a16="http://schemas.microsoft.com/office/drawing/2014/main" id="{9790D072-325E-4DDC-8A6C-5BDB183236F0}"/>
+              </a:ext>
+            </a:extLst>
+          </p:cNvPr>
+          <p:cNvSpPr>
+            <a:spLocks noGrp="1"/>
+          </p:cNvSpPr>
+          <p:nvPr>
+            <p:ph type="title"/>
+          </p:nvPr>
+        </p:nvSpPr>
+        <p:spPr/>
+        <p:txBody>
+          <a:bodyPr/>
+          <a:lstStyle/>
+          <a:p>
+            <a:r>
+              <a:rPr lang="en-US" b="1" dirty="0"/>
+              <a:t>Customer classes</a:t>
+            </a:r>
+            <a:endParaRPr lang="it-IT" b="1" dirty="0"/>
+          </a:p>
+        </p:txBody>
+      </p:sp>
+      <p:sp>
+        <p:nvSpPr>
+          <p:cNvPr id="3" name="Content Placeholder 2">
+            <a:extLst>
+              <a:ext uri="{FF2B5EF4-FFF2-40B4-BE49-F238E27FC236}">
+                <a16:creationId xmlns:a16="http://schemas.microsoft.com/office/drawing/2014/main" id="{305453E0-11E2-461E-864C-19AB5A26BF08}"/>
+              </a:ext>
+            </a:extLst>
+          </p:cNvPr>
+          <p:cNvSpPr>
+            <a:spLocks noGrp="1"/>
+          </p:cNvSpPr>
+          <p:nvPr>
+            <p:ph idx="1"/>
+          </p:nvPr>
+        </p:nvSpPr>
+        <p:spPr/>
+        <p:txBody>
+          <a:bodyPr/>
+          <a:lstStyle/>
+          <a:p>
+            <a:endParaRPr lang="it-IT"/>
+          </a:p>
+        </p:txBody>
+      </p:sp>
+    </p:spTree>
+    <p:extLst>
+      <p:ext uri="{BB962C8B-B14F-4D97-AF65-F5344CB8AC3E}">
+        <p14:creationId xmlns:p14="http://schemas.microsoft.com/office/powerpoint/2010/main" val="527354009"/>
+      </p:ext>
+    </p:extLst>
+  </p:cSld>
+  <p:clrMapOvr>
+    <a:masterClrMapping/>
+  </p:clrMapOvr>
+</p:sld>
+</file>
+
+<file path=ppt/slides/slide12.xml><?xml version="1.0" encoding="utf-8"?>
+<p:sld xmlns:a="http://schemas.openxmlformats.org/drawingml/2006/main" xmlns:r="http://schemas.openxmlformats.org/officeDocument/2006/relationships" xmlns:p="http://schemas.openxmlformats.org/presentationml/2006/main">
+  <p:cSld>
+    <p:spTree>
+      <p:nvGrpSpPr>
+        <p:cNvPr id="1" name=""/>
+        <p:cNvGrpSpPr/>
+        <p:nvPr/>
+      </p:nvGrpSpPr>
+      <p:grpSpPr>
+        <a:xfrm>
+          <a:off x="0" y="0"/>
+          <a:ext cx="0" cy="0"/>
+          <a:chOff x="0" y="0"/>
+          <a:chExt cx="0" cy="0"/>
+        </a:xfrm>
+      </p:grpSpPr>
+      <p:sp>
+        <p:nvSpPr>
+          <p:cNvPr id="2" name="Title 1">
+            <a:extLst>
+              <a:ext uri="{FF2B5EF4-FFF2-40B4-BE49-F238E27FC236}">
+                <a16:creationId xmlns:a16="http://schemas.microsoft.com/office/drawing/2014/main" id="{DF00E9FC-9A84-4C2B-A8ED-2259FEE7C6A8}"/>
+              </a:ext>
+            </a:extLst>
+          </p:cNvPr>
+          <p:cNvSpPr>
+            <a:spLocks noGrp="1"/>
+          </p:cNvSpPr>
+          <p:nvPr>
+            <p:ph type="title"/>
+          </p:nvPr>
+        </p:nvSpPr>
+        <p:spPr/>
+        <p:txBody>
+          <a:bodyPr/>
+          <a:lstStyle/>
+          <a:p>
+            <a:r>
+              <a:rPr lang="en-US" dirty="0"/>
+              <a:t>Step 2 : Optimization algorithm (greedy learner)</a:t>
+            </a:r>
+            <a:endParaRPr lang="it-IT" dirty="0"/>
+          </a:p>
+        </p:txBody>
+      </p:sp>
+      <p:sp>
+        <p:nvSpPr>
+          <p:cNvPr id="3" name="Content Placeholder 2">
+            <a:extLst>
+              <a:ext uri="{FF2B5EF4-FFF2-40B4-BE49-F238E27FC236}">
+                <a16:creationId xmlns:a16="http://schemas.microsoft.com/office/drawing/2014/main" id="{741E2AB6-DBC2-4C24-AE4D-34D9854845F5}"/>
+              </a:ext>
+            </a:extLst>
+          </p:cNvPr>
+          <p:cNvSpPr>
+            <a:spLocks noGrp="1"/>
+          </p:cNvSpPr>
+          <p:nvPr>
+            <p:ph idx="1"/>
+          </p:nvPr>
+        </p:nvSpPr>
+        <p:spPr/>
+        <p:txBody>
+          <a:bodyPr/>
+          <a:lstStyle/>
+          <a:p>
+            <a:endParaRPr lang="it-IT"/>
+          </a:p>
+        </p:txBody>
+      </p:sp>
+    </p:spTree>
+    <p:extLst>
+      <p:ext uri="{BB962C8B-B14F-4D97-AF65-F5344CB8AC3E}">
+        <p14:creationId xmlns:p14="http://schemas.microsoft.com/office/powerpoint/2010/main" val="147077479"/>
+      </p:ext>
+    </p:extLst>
+  </p:cSld>
+  <p:clrMapOvr>
+    <a:masterClrMapping/>
+  </p:clrMapOvr>
+</p:sld>
+</file>
+
+<file path=ppt/slides/slide2.xml><?xml version="1.0" encoding="utf-8"?>
+<p:sld xmlns:a="http://schemas.openxmlformats.org/drawingml/2006/main" xmlns:r="http://schemas.openxmlformats.org/officeDocument/2006/relationships" xmlns:p="http://schemas.openxmlformats.org/presentationml/2006/main">
+  <p:cSld>
+    <p:bg>
+      <p:bgPr>
+        <a:solidFill>
+          <a:schemeClr val="bg1"/>
+        </a:solidFill>
+        <a:effectLst/>
+      </p:bgPr>
+    </p:bg>
+    <p:spTree>
+      <p:nvGrpSpPr>
+        <p:cNvPr id="1" name=""/>
+        <p:cNvGrpSpPr/>
+        <p:nvPr/>
+      </p:nvGrpSpPr>
+      <p:grpSpPr>
+        <a:xfrm>
+          <a:off x="0" y="0"/>
+          <a:ext cx="0" cy="0"/>
+          <a:chOff x="0" y="0"/>
+          <a:chExt cx="0" cy="0"/>
+        </a:xfrm>
+      </p:grpSpPr>
+      <p:sp>
+        <p:nvSpPr>
+          <p:cNvPr id="27" name="Rectangle 16">
+            <a:extLst>
+              <a:ext uri="{FF2B5EF4-FFF2-40B4-BE49-F238E27FC236}">
+                <a16:creationId xmlns:a16="http://schemas.microsoft.com/office/drawing/2014/main" id="{2B566528-1B12-4246-9431-5C2D7D081168}"/>
+              </a:ext>
+              <a:ext uri="{C183D7F6-B498-43B3-948B-1728B52AA6E4}">
+                <adec:decorative xmlns:adec="http://schemas.microsoft.com/office/drawing/2017/decorative" val="1"/>
+              </a:ext>
+            </a:extLst>
+          </p:cNvPr>
+          <p:cNvSpPr>
+            <a:spLocks noGrp="1" noRot="1" noChangeAspect="1" noMove="1" noResize="1" noEditPoints="1" noAdjustHandles="1" noChangeArrowheads="1" noChangeShapeType="1" noTextEdit="1"/>
+          </p:cNvSpPr>
+          <p:nvPr>
+            <p:extLst>
+              <p:ext uri="{386F3935-93C4-4BCD-93E2-E3B085C9AB24}">
+                <p16:designElem xmlns:p16="http://schemas.microsoft.com/office/powerpoint/2015/main" val="1"/>
+              </p:ext>
+            </p:extLst>
+          </p:nvPr>
+        </p:nvSpPr>
+        <p:spPr>
+          <a:xfrm>
+            <a:off x="0" y="0"/>
+            <a:ext cx="12192000" cy="6858000"/>
+          </a:xfrm>
+          <a:prstGeom prst="rect">
+            <a:avLst/>
+          </a:prstGeom>
+          <a:solidFill>
+            <a:schemeClr val="bg1"/>
+          </a:solidFill>
+          <a:ln>
+            <a:noFill/>
+          </a:ln>
+        </p:spPr>
+        <p:style>
+          <a:lnRef idx="2">
+            <a:schemeClr val="accent1">
+              <a:shade val="50000"/>
+            </a:schemeClr>
+          </a:lnRef>
+          <a:fillRef idx="1">
+            <a:schemeClr val="accent1"/>
+          </a:fillRef>
+          <a:effectRef idx="0">
+            <a:schemeClr val="accent1"/>
+          </a:effectRef>
+          <a:fontRef idx="minor">
+            <a:schemeClr val="lt1"/>
+          </a:fontRef>
+        </p:style>
+        <p:txBody>
+          <a:bodyPr rtlCol="0" anchor="ctr"/>
+          <a:lstStyle/>
+          <a:p>
+            <a:pPr algn="ctr"/>
+            <a:endParaRPr lang="en-US" dirty="0"/>
+          </a:p>
+        </p:txBody>
+      </p:sp>
+      <p:grpSp>
+        <p:nvGrpSpPr>
+          <p:cNvPr id="28" name="Group 18">
+            <a:extLst>
+              <a:ext uri="{FF2B5EF4-FFF2-40B4-BE49-F238E27FC236}">
+                <a16:creationId xmlns:a16="http://schemas.microsoft.com/office/drawing/2014/main" id="{287F69AB-2350-44E3-9076-00265B93F313}"/>
+              </a:ext>
+              <a:ext uri="{C183D7F6-B498-43B3-948B-1728B52AA6E4}">
+                <adec:decorative xmlns:adec="http://schemas.microsoft.com/office/drawing/2017/decorative" val="1"/>
+              </a:ext>
+            </a:extLst>
+          </p:cNvPr>
+          <p:cNvGrpSpPr>
+            <a:grpSpLocks noGrp="1" noUngrp="1" noRot="1" noChangeAspect="1" noMove="1" noResize="1"/>
+          </p:cNvGrpSpPr>
+          <p:nvPr>
+            <p:extLst>
+              <p:ext uri="{386F3935-93C4-4BCD-93E2-E3B085C9AB24}">
+                <p16:designElem xmlns:p16="http://schemas.microsoft.com/office/powerpoint/2015/main" val="1"/>
+              </p:ext>
+            </p:extLst>
+          </p:nvPr>
+        </p:nvGrpSpPr>
+        <p:grpSpPr>
+          <a:xfrm flipH="1">
+            <a:off x="0" y="1"/>
+            <a:ext cx="972709" cy="1935307"/>
+            <a:chOff x="10918968" y="713127"/>
+            <a:chExt cx="1273032" cy="2532832"/>
+          </a:xfrm>
+        </p:grpSpPr>
+        <p:sp>
+          <p:nvSpPr>
+            <p:cNvPr id="29" name="Rectangle 19">
+              <a:extLst>
+                <a:ext uri="{FF2B5EF4-FFF2-40B4-BE49-F238E27FC236}">
+                  <a16:creationId xmlns:a16="http://schemas.microsoft.com/office/drawing/2014/main" id="{D70652AA-1C81-481C-856B-90371437540F}"/>
+                </a:ext>
+                <a:ext uri="{C183D7F6-B498-43B3-948B-1728B52AA6E4}">
+                  <adec:decorative xmlns:adec="http://schemas.microsoft.com/office/drawing/2017/decorative" val="1"/>
+                </a:ext>
+              </a:extLst>
+            </p:cNvPr>
+            <p:cNvSpPr/>
+            <p:nvPr>
+              <p:extLst>
+                <p:ext uri="{386F3935-93C4-4BCD-93E2-E3B085C9AB24}">
+                  <p16:designElem xmlns:p16="http://schemas.microsoft.com/office/powerpoint/2015/main" val="1"/>
+                </p:ext>
+              </p:extLst>
+            </p:nvPr>
+          </p:nvSpPr>
+          <p:spPr>
+            <a:xfrm rot="2700000">
+              <a:off x="11052629" y="2120024"/>
+              <a:ext cx="645368" cy="645368"/>
+            </a:xfrm>
+            <a:prstGeom prst="rect">
+              <a:avLst/>
+            </a:prstGeom>
+            <a:solidFill>
+              <a:schemeClr val="accent4">
+                <a:alpha val="30000"/>
+              </a:schemeClr>
+            </a:solidFill>
+            <a:ln>
+              <a:noFill/>
+            </a:ln>
+          </p:spPr>
+          <p:style>
+            <a:lnRef idx="2">
+              <a:schemeClr val="accent1">
+                <a:shade val="50000"/>
+              </a:schemeClr>
+            </a:lnRef>
+            <a:fillRef idx="1">
+              <a:schemeClr val="accent1"/>
+            </a:fillRef>
+            <a:effectRef idx="0">
+              <a:schemeClr val="accent1"/>
+            </a:effectRef>
+            <a:fontRef idx="minor">
+              <a:schemeClr val="lt1"/>
+            </a:fontRef>
+          </p:style>
+          <p:txBody>
+            <a:bodyPr rtlCol="0" anchor="ctr"/>
+            <a:lstStyle/>
+            <a:p>
+              <a:pPr algn="ctr"/>
+              <a:endParaRPr lang="en-US"/>
+            </a:p>
+          </p:txBody>
+        </p:sp>
+        <p:sp>
+          <p:nvSpPr>
+            <p:cNvPr id="30" name="Isosceles Triangle 20">
+              <a:extLst>
+                <a:ext uri="{FF2B5EF4-FFF2-40B4-BE49-F238E27FC236}">
+                  <a16:creationId xmlns:a16="http://schemas.microsoft.com/office/drawing/2014/main" id="{A2FF99B6-37BA-4650-B01D-799F02E31EB7}"/>
+                </a:ext>
+                <a:ext uri="{C183D7F6-B498-43B3-948B-1728B52AA6E4}">
+                  <adec:decorative xmlns:adec="http://schemas.microsoft.com/office/drawing/2017/decorative" val="1"/>
+                </a:ext>
+              </a:extLst>
+            </p:cNvPr>
+            <p:cNvSpPr/>
+            <p:nvPr>
+              <p:extLst>
+                <p:ext uri="{386F3935-93C4-4BCD-93E2-E3B085C9AB24}">
+                  <p16:designElem xmlns:p16="http://schemas.microsoft.com/office/powerpoint/2015/main" val="1"/>
+                </p:ext>
+              </p:extLst>
+            </p:nvPr>
+          </p:nvSpPr>
+          <p:spPr>
+            <a:xfrm rot="16200000">
+              <a:off x="10289068" y="1343027"/>
+              <a:ext cx="2532832" cy="1273032"/>
+            </a:xfrm>
+            <a:prstGeom prst="triangle">
+              <a:avLst>
+                <a:gd name="adj" fmla="val 50000"/>
+              </a:avLst>
+            </a:prstGeom>
+            <a:solidFill>
+              <a:schemeClr val="accent4">
+                <a:alpha val="30000"/>
+              </a:schemeClr>
+            </a:solidFill>
+            <a:ln>
+              <a:noFill/>
+            </a:ln>
+          </p:spPr>
+          <p:style>
+            <a:lnRef idx="2">
+              <a:schemeClr val="accent1">
+                <a:shade val="50000"/>
+              </a:schemeClr>
+            </a:lnRef>
+            <a:fillRef idx="1">
+              <a:schemeClr val="accent1"/>
+            </a:fillRef>
+            <a:effectRef idx="0">
+              <a:schemeClr val="accent1"/>
+            </a:effectRef>
+            <a:fontRef idx="minor">
+              <a:schemeClr val="lt1"/>
+            </a:fontRef>
+          </p:style>
+          <p:txBody>
+            <a:bodyPr rtlCol="0" anchor="ctr"/>
+            <a:lstStyle/>
+            <a:p>
+              <a:pPr algn="ctr"/>
+              <a:endParaRPr lang="en-US" dirty="0"/>
+            </a:p>
+          </p:txBody>
+        </p:sp>
+      </p:grpSp>
+      <p:sp>
+        <p:nvSpPr>
+          <p:cNvPr id="2" name="Title 1">
+            <a:extLst>
+              <a:ext uri="{FF2B5EF4-FFF2-40B4-BE49-F238E27FC236}">
                 <a16:creationId xmlns:a16="http://schemas.microsoft.com/office/drawing/2014/main" id="{6A03154C-0875-45B5-8F24-31898320100B}"/>
               </a:ext>
             </a:extLst>
@@ -3519,19 +4231,56 @@
             <p:ph type="title"/>
           </p:nvPr>
         </p:nvSpPr>
-        <p:spPr/>
-        <p:txBody>
-          <a:bodyPr/>
-          <a:lstStyle/>
-          <a:p>
-            <a:r>
-              <a:rPr lang="en-US" dirty="0"/>
+        <p:spPr>
+          <a:xfrm>
+            <a:off x="643467" y="321734"/>
+            <a:ext cx="10905066" cy="1135737"/>
+          </a:xfrm>
+        </p:spPr>
+        <p:txBody>
+          <a:bodyPr>
+            <a:normAutofit/>
+          </a:bodyPr>
+          <a:lstStyle/>
+          <a:p>
+            <a:r>
+              <a:rPr lang="en-US" sz="3600" b="1" dirty="0"/>
               <a:t>Common part</a:t>
             </a:r>
-            <a:endParaRPr lang="it-IT" dirty="0"/>
-          </a:p>
-        </p:txBody>
-      </p:sp>
+            <a:endParaRPr lang="it-IT" sz="3600" b="1" dirty="0"/>
+          </a:p>
+        </p:txBody>
+      </p:sp>
+      <p:pic>
+        <p:nvPicPr>
+          <p:cNvPr id="5" name="Picture 4">
+            <a:extLst>
+              <a:ext uri="{FF2B5EF4-FFF2-40B4-BE49-F238E27FC236}">
+                <a16:creationId xmlns:a16="http://schemas.microsoft.com/office/drawing/2014/main" id="{D5B67FC0-ADD5-4205-AE92-739A399C6483}"/>
+              </a:ext>
+            </a:extLst>
+          </p:cNvPr>
+          <p:cNvPicPr>
+            <a:picLocks noChangeAspect="1"/>
+          </p:cNvPicPr>
+          <p:nvPr/>
+        </p:nvPicPr>
+        <p:blipFill>
+          <a:blip r:embed="rId2"/>
+          <a:stretch>
+            <a:fillRect/>
+          </a:stretch>
+        </p:blipFill>
+        <p:spPr>
+          <a:xfrm>
+            <a:off x="643467" y="1782981"/>
+            <a:ext cx="6253214" cy="3392367"/>
+          </a:xfrm>
+          <a:prstGeom prst="rect">
+            <a:avLst/>
+          </a:prstGeom>
+        </p:spPr>
+      </p:pic>
       <p:sp>
         <p:nvSpPr>
           <p:cNvPr id="3" name="Content Placeholder 2">
@@ -3548,15 +4297,234 @@
             <p:ph idx="1"/>
           </p:nvPr>
         </p:nvSpPr>
-        <p:spPr/>
-        <p:txBody>
-          <a:bodyPr/>
-          <a:lstStyle/>
-          <a:p>
-            <a:endParaRPr lang="it-IT"/>
-          </a:p>
-        </p:txBody>
-      </p:sp>
+        <p:spPr>
+          <a:xfrm>
+            <a:off x="7544052" y="1782981"/>
+            <a:ext cx="4004479" cy="4393982"/>
+          </a:xfrm>
+        </p:spPr>
+        <p:txBody>
+          <a:bodyPr>
+            <a:normAutofit/>
+          </a:bodyPr>
+          <a:lstStyle/>
+          <a:p>
+            <a:r>
+              <a:rPr lang="en-US" sz="2000" dirty="0"/>
+              <a:t>E-commerce website selling 5 products</a:t>
+            </a:r>
+          </a:p>
+          <a:p>
+            <a:r>
+              <a:rPr lang="en-US" sz="2000" b="1" dirty="0"/>
+              <a:t>Behavior:</a:t>
+            </a:r>
+          </a:p>
+          <a:p>
+            <a:pPr lvl="1"/>
+            <a:r>
+              <a:rPr lang="en-US" sz="1600" b="0" i="0" u="none" strike="noStrike" dirty="0">
+                <a:solidFill>
+                  <a:srgbClr val="000000"/>
+                </a:solidFill>
+                <a:effectLst/>
+                <a:latin typeface="Arial" panose="020B0604020202020204" pitchFamily="34" charset="0"/>
+              </a:rPr>
+              <a:t>she/he buys a number of units of the primary product if the price of a single unit is under the user’ reservation price (single unit price)</a:t>
+            </a:r>
+          </a:p>
+          <a:p>
+            <a:pPr lvl="1"/>
+            <a:r>
+              <a:rPr lang="en-US" sz="1600" b="0" i="0" u="none" strike="noStrike" dirty="0">
+                <a:solidFill>
+                  <a:srgbClr val="000000"/>
+                </a:solidFill>
+                <a:effectLst/>
+                <a:latin typeface="Arial" panose="020B0604020202020204" pitchFamily="34" charset="0"/>
+              </a:rPr>
+              <a:t>once the primary product has been bought, the user clicks on a secondary product with a probability p (to be defined later)</a:t>
+            </a:r>
+          </a:p>
+          <a:p>
+            <a:pPr lvl="1"/>
+            <a:endParaRPr lang="en-US" sz="1600" b="0" i="0" u="none" strike="noStrike" dirty="0">
+              <a:solidFill>
+                <a:srgbClr val="000000"/>
+              </a:solidFill>
+              <a:effectLst/>
+              <a:latin typeface="Arial" panose="020B0604020202020204" pitchFamily="34" charset="0"/>
+            </a:endParaRPr>
+          </a:p>
+          <a:p>
+            <a:pPr lvl="1"/>
+            <a:endParaRPr lang="en-US" sz="800" dirty="0"/>
+          </a:p>
+          <a:p>
+            <a:endParaRPr lang="it-IT" sz="2000" dirty="0"/>
+          </a:p>
+        </p:txBody>
+      </p:sp>
+      <p:grpSp>
+        <p:nvGrpSpPr>
+          <p:cNvPr id="31" name="Group 22">
+            <a:extLst>
+              <a:ext uri="{FF2B5EF4-FFF2-40B4-BE49-F238E27FC236}">
+                <a16:creationId xmlns:a16="http://schemas.microsoft.com/office/drawing/2014/main" id="{3EA7D759-6BEF-4CBD-A325-BCFA77832B3F}"/>
+              </a:ext>
+              <a:ext uri="{C183D7F6-B498-43B3-948B-1728B52AA6E4}">
+                <adec:decorative xmlns:adec="http://schemas.microsoft.com/office/drawing/2017/decorative" val="1"/>
+              </a:ext>
+            </a:extLst>
+          </p:cNvPr>
+          <p:cNvGrpSpPr>
+            <a:grpSpLocks noGrp="1" noUngrp="1" noRot="1" noChangeAspect="1" noMove="1" noResize="1"/>
+          </p:cNvGrpSpPr>
+          <p:nvPr>
+            <p:extLst>
+              <p:ext uri="{386F3935-93C4-4BCD-93E2-E3B085C9AB24}">
+                <p16:designElem xmlns:p16="http://schemas.microsoft.com/office/powerpoint/2015/main" val="1"/>
+              </p:ext>
+            </p:extLst>
+          </p:nvPr>
+        </p:nvGrpSpPr>
+        <p:grpSpPr>
+          <a:xfrm>
+            <a:off x="11177940" y="4601497"/>
+            <a:ext cx="1014060" cy="2017580"/>
+            <a:chOff x="11177940" y="4601497"/>
+            <a:chExt cx="1014060" cy="2017580"/>
+          </a:xfrm>
+        </p:grpSpPr>
+        <p:sp>
+          <p:nvSpPr>
+            <p:cNvPr id="32" name="Isosceles Triangle 23">
+              <a:extLst>
+                <a:ext uri="{FF2B5EF4-FFF2-40B4-BE49-F238E27FC236}">
+                  <a16:creationId xmlns:a16="http://schemas.microsoft.com/office/drawing/2014/main" id="{317405EC-53E3-473A-8B42-B9475D057B66}"/>
+                </a:ext>
+                <a:ext uri="{C183D7F6-B498-43B3-948B-1728B52AA6E4}">
+                  <adec:decorative xmlns:adec="http://schemas.microsoft.com/office/drawing/2017/decorative" val="1"/>
+                </a:ext>
+              </a:extLst>
+            </p:cNvPr>
+            <p:cNvSpPr/>
+            <p:nvPr>
+              <p:extLst>
+                <p:ext uri="{386F3935-93C4-4BCD-93E2-E3B085C9AB24}">
+                  <p16:designElem xmlns:p16="http://schemas.microsoft.com/office/powerpoint/2015/main" val="1"/>
+                </p:ext>
+              </p:extLst>
+            </p:nvPr>
+          </p:nvSpPr>
+          <p:spPr>
+            <a:xfrm rot="16200000" flipH="1">
+              <a:off x="10676180" y="5103257"/>
+              <a:ext cx="2017580" cy="1014060"/>
+            </a:xfrm>
+            <a:prstGeom prst="triangle">
+              <a:avLst>
+                <a:gd name="adj" fmla="val 50000"/>
+              </a:avLst>
+            </a:prstGeom>
+            <a:solidFill>
+              <a:schemeClr val="accent1">
+                <a:alpha val="30000"/>
+              </a:schemeClr>
+            </a:solidFill>
+            <a:ln>
+              <a:noFill/>
+            </a:ln>
+          </p:spPr>
+          <p:style>
+            <a:lnRef idx="2">
+              <a:schemeClr val="accent1">
+                <a:shade val="50000"/>
+              </a:schemeClr>
+            </a:lnRef>
+            <a:fillRef idx="1">
+              <a:schemeClr val="accent1"/>
+            </a:fillRef>
+            <a:effectRef idx="0">
+              <a:schemeClr val="accent1"/>
+            </a:effectRef>
+            <a:fontRef idx="minor">
+              <a:schemeClr val="lt1"/>
+            </a:fontRef>
+          </p:style>
+          <p:txBody>
+            <a:bodyPr rtlCol="0" anchor="ctr"/>
+            <a:lstStyle/>
+            <a:p>
+              <a:pPr algn="ctr"/>
+              <a:endParaRPr lang="en-US"/>
+            </a:p>
+          </p:txBody>
+        </p:sp>
+        <p:sp>
+          <p:nvSpPr>
+            <p:cNvPr id="33" name="Rectangle 24">
+              <a:extLst>
+                <a:ext uri="{FF2B5EF4-FFF2-40B4-BE49-F238E27FC236}">
+                  <a16:creationId xmlns:a16="http://schemas.microsoft.com/office/drawing/2014/main" id="{C03F2370-11B5-4E16-8AE5-B4854408B401}"/>
+                </a:ext>
+                <a:ext uri="{C183D7F6-B498-43B3-948B-1728B52AA6E4}">
+                  <adec:decorative xmlns:adec="http://schemas.microsoft.com/office/drawing/2017/decorative" val="1"/>
+                </a:ext>
+              </a:extLst>
+            </p:cNvPr>
+            <p:cNvSpPr/>
+            <p:nvPr>
+              <p:extLst>
+                <p:ext uri="{386F3935-93C4-4BCD-93E2-E3B085C9AB24}">
+                  <p16:designElem xmlns:p16="http://schemas.microsoft.com/office/powerpoint/2015/main" val="1"/>
+                </p:ext>
+              </p:extLst>
+            </p:nvPr>
+          </p:nvSpPr>
+          <p:spPr>
+            <a:xfrm rot="2700000">
+              <a:off x="11278506" y="5728708"/>
+              <a:ext cx="485578" cy="485578"/>
+            </a:xfrm>
+            <a:prstGeom prst="rect">
+              <a:avLst/>
+            </a:prstGeom>
+            <a:solidFill>
+              <a:schemeClr val="accent1">
+                <a:alpha val="30000"/>
+              </a:schemeClr>
+            </a:solidFill>
+            <a:ln>
+              <a:noFill/>
+            </a:ln>
+          </p:spPr>
+          <p:style>
+            <a:lnRef idx="2">
+              <a:schemeClr val="accent1">
+                <a:shade val="50000"/>
+              </a:schemeClr>
+            </a:lnRef>
+            <a:fillRef idx="1">
+              <a:schemeClr val="accent1"/>
+            </a:fillRef>
+            <a:effectRef idx="0">
+              <a:schemeClr val="accent1"/>
+            </a:effectRef>
+            <a:fontRef idx="minor">
+              <a:schemeClr val="lt1"/>
+            </a:fontRef>
+          </p:style>
+          <p:txBody>
+            <a:bodyPr rtlCol="0" anchor="ctr"/>
+            <a:lstStyle/>
+            <a:p>
+              <a:pPr algn="ctr"/>
+              <a:endParaRPr lang="en-US"/>
+            </a:p>
+          </p:txBody>
+        </p:sp>
+      </p:grpSp>
     </p:spTree>
     <p:extLst>
       <p:ext uri="{BB962C8B-B14F-4D97-AF65-F5344CB8AC3E}">
@@ -3592,7 +4560,7 @@
           <p:cNvPr id="2" name="Title 1">
             <a:extLst>
               <a:ext uri="{FF2B5EF4-FFF2-40B4-BE49-F238E27FC236}">
-                <a16:creationId xmlns:a16="http://schemas.microsoft.com/office/drawing/2014/main" id="{81EF4448-BDBE-429C-BDDD-6E410B431A0C}"/>
+                <a16:creationId xmlns:a16="http://schemas.microsoft.com/office/drawing/2014/main" id="{DDF3050C-2E79-4F38-9889-B346FF3F7007}"/>
               </a:ext>
             </a:extLst>
           </p:cNvPr>
@@ -3608,43 +4576,68 @@
           <a:bodyPr/>
           <a:lstStyle/>
           <a:p>
+            <a:endParaRPr lang="it-IT"/>
+          </a:p>
+        </p:txBody>
+      </p:sp>
+      <p:sp>
+        <p:nvSpPr>
+          <p:cNvPr id="3" name="Content Placeholder 2">
+            <a:extLst>
+              <a:ext uri="{FF2B5EF4-FFF2-40B4-BE49-F238E27FC236}">
+                <a16:creationId xmlns:a16="http://schemas.microsoft.com/office/drawing/2014/main" id="{2B9FFDFF-683B-4D43-AAA9-B71E67ACFAAD}"/>
+              </a:ext>
+            </a:extLst>
+          </p:cNvPr>
+          <p:cNvSpPr>
+            <a:spLocks noGrp="1"/>
+          </p:cNvSpPr>
+          <p:nvPr>
+            <p:ph idx="1"/>
+          </p:nvPr>
+        </p:nvSpPr>
+        <p:spPr/>
+        <p:txBody>
+          <a:bodyPr>
+            <a:normAutofit fontScale="92500" lnSpcReduction="10000"/>
+          </a:bodyPr>
+          <a:lstStyle/>
+          <a:p>
             <a:r>
               <a:rPr lang="en-US" dirty="0"/>
-              <a:t>Step 1: Environment</a:t>
-            </a:r>
+              <a:t>For simplicity, we make the following assumptions:</a:t>
+            </a:r>
+          </a:p>
+          <a:p>
+            <a:endParaRPr lang="en-US" dirty="0"/>
+          </a:p>
+          <a:p>
+            <a:r>
+              <a:rPr lang="en-US" dirty="0"/>
+              <a:t>the clicks on the secondary products are independent of each other and the user can click on multiple secondary products, so as to activate multiple parallel paths over the graph depicted above;</a:t>
+            </a:r>
+          </a:p>
+          <a:p>
+            <a:r>
+              <a:rPr lang="en-US" dirty="0"/>
+              <a:t>the number of items a user will buy is a random variable independent of any other variable; that is, the user decides first whether to buy or not the products and, subsequently, in the case of a purchase, the number of units to buy;</a:t>
+            </a:r>
+          </a:p>
+          <a:p>
+            <a:r>
+              <a:rPr lang="en-US" dirty="0"/>
+              <a:t>the actions performed by the users are perfectly observable by the ecommerce website.</a:t>
+            </a:r>
+          </a:p>
+          <a:p>
             <a:endParaRPr lang="it-IT" dirty="0"/>
-          </a:p>
-        </p:txBody>
-      </p:sp>
-      <p:sp>
-        <p:nvSpPr>
-          <p:cNvPr id="3" name="Content Placeholder 2">
-            <a:extLst>
-              <a:ext uri="{FF2B5EF4-FFF2-40B4-BE49-F238E27FC236}">
-                <a16:creationId xmlns:a16="http://schemas.microsoft.com/office/drawing/2014/main" id="{8B6C581B-EBD2-4B22-81D7-3E4EA42F5D29}"/>
-              </a:ext>
-            </a:extLst>
-          </p:cNvPr>
-          <p:cNvSpPr>
-            <a:spLocks noGrp="1"/>
-          </p:cNvSpPr>
-          <p:nvPr>
-            <p:ph idx="1"/>
-          </p:nvPr>
-        </p:nvSpPr>
-        <p:spPr/>
-        <p:txBody>
-          <a:bodyPr/>
-          <a:lstStyle/>
-          <a:p>
-            <a:endParaRPr lang="it-IT"/>
           </a:p>
         </p:txBody>
       </p:sp>
     </p:spTree>
     <p:extLst>
       <p:ext uri="{BB962C8B-B14F-4D97-AF65-F5344CB8AC3E}">
-        <p14:creationId xmlns:p14="http://schemas.microsoft.com/office/powerpoint/2010/main" val="535354618"/>
+        <p14:creationId xmlns:p14="http://schemas.microsoft.com/office/powerpoint/2010/main" val="193435394"/>
       </p:ext>
     </p:extLst>
   </p:cSld>
@@ -3676,7 +4669,7 @@
           <p:cNvPr id="2" name="Title 1">
             <a:extLst>
               <a:ext uri="{FF2B5EF4-FFF2-40B4-BE49-F238E27FC236}">
-                <a16:creationId xmlns:a16="http://schemas.microsoft.com/office/drawing/2014/main" id="{DF00E9FC-9A84-4C2B-A8ED-2259FEE7C6A8}"/>
+                <a16:creationId xmlns:a16="http://schemas.microsoft.com/office/drawing/2014/main" id="{51CE4D66-5545-4D36-8203-CA5B7A5DFD64}"/>
               </a:ext>
             </a:extLst>
           </p:cNvPr>
@@ -3692,43 +4685,755 @@
           <a:bodyPr/>
           <a:lstStyle/>
           <a:p>
-            <a:r>
+            <a:endParaRPr lang="it-IT"/>
+          </a:p>
+        </p:txBody>
+      </p:sp>
+      <p:sp>
+        <p:nvSpPr>
+          <p:cNvPr id="3" name="Content Placeholder 2">
+            <a:extLst>
+              <a:ext uri="{FF2B5EF4-FFF2-40B4-BE49-F238E27FC236}">
+                <a16:creationId xmlns:a16="http://schemas.microsoft.com/office/drawing/2014/main" id="{AB3A2C85-5DD5-40AD-898C-A0E657267DB6}"/>
+              </a:ext>
+            </a:extLst>
+          </p:cNvPr>
+          <p:cNvSpPr>
+            <a:spLocks noGrp="1"/>
+          </p:cNvSpPr>
+          <p:nvPr>
+            <p:ph idx="1"/>
+          </p:nvPr>
+        </p:nvSpPr>
+        <p:spPr/>
+        <p:txBody>
+          <a:bodyPr/>
+          <a:lstStyle/>
+          <a:p>
+            <a:pPr algn="just" rtl="0">
+              <a:spcBef>
+                <a:spcPts val="0"/>
+              </a:spcBef>
+              <a:spcAft>
+                <a:spcPts val="0"/>
+              </a:spcAft>
+            </a:pPr>
+            <a:r>
+              <a:rPr lang="en-US" sz="1800" b="0" i="0" u="none" strike="noStrike" dirty="0">
+                <a:solidFill>
+                  <a:srgbClr val="000000"/>
+                </a:solidFill>
+                <a:effectLst/>
+                <a:latin typeface="Arial" panose="020B0604020202020204" pitchFamily="34" charset="0"/>
+              </a:rPr>
+              <a:t>Every day, there is a random number of potential new customers (returning customers are not considered here). In particular, every single customer can land on the webpage in which one of the 5 products is primary or on the webpage of a product sold by a (non-strategic) competitor. Call 𝛼_</a:t>
+            </a:r>
+            <a:r>
+              <a:rPr lang="en-US" sz="1800" b="0" i="0" u="none" strike="noStrike" dirty="0" err="1">
+                <a:solidFill>
+                  <a:srgbClr val="000000"/>
+                </a:solidFill>
+                <a:effectLst/>
+                <a:latin typeface="Arial" panose="020B0604020202020204" pitchFamily="34" charset="0"/>
+              </a:rPr>
+              <a:t>i</a:t>
+            </a:r>
+            <a:r>
+              <a:rPr lang="en-US" sz="1800" b="0" i="0" u="none" strike="noStrike" dirty="0">
+                <a:solidFill>
+                  <a:srgbClr val="000000"/>
+                </a:solidFill>
+                <a:effectLst/>
+                <a:latin typeface="Arial" panose="020B0604020202020204" pitchFamily="34" charset="0"/>
+              </a:rPr>
+              <a:t> the ratio of customers landing on the webpage in which product Pi is primary, and call 𝛼_0 the ratio of customers landing on the webpage of a competitor. In practice, you can only consider the 𝛼 ratios and disregard the total number of users. However, the 𝛼 ratios will be subject to noise. That is, every day, the value of the 𝛼 ratios will be realizations of independent Dirichlet random variables.</a:t>
+            </a:r>
+            <a:endParaRPr lang="en-US" b="0" dirty="0">
+              <a:effectLst/>
+            </a:endParaRPr>
+          </a:p>
+          <a:p>
+            <a:pPr algn="just" rtl="0">
+              <a:spcBef>
+                <a:spcPts val="0"/>
+              </a:spcBef>
+              <a:spcAft>
+                <a:spcPts val="0"/>
+              </a:spcAft>
+            </a:pPr>
+            <a:br>
+              <a:rPr lang="en-US" b="0" dirty="0">
+                <a:effectLst/>
+              </a:rPr>
+            </a:br>
+            <a:r>
+              <a:rPr lang="en-US" sz="1800" b="0" i="0" u="none" strike="noStrike" dirty="0">
+                <a:solidFill>
+                  <a:srgbClr val="000000"/>
+                </a:solidFill>
+                <a:effectLst/>
+                <a:latin typeface="Arial" panose="020B0604020202020204" pitchFamily="34" charset="0"/>
+              </a:rPr>
+              <a:t>The following picture summarizes the overall scenario.</a:t>
+            </a:r>
+            <a:endParaRPr lang="en-US" b="0" dirty="0">
+              <a:effectLst/>
+            </a:endParaRPr>
+          </a:p>
+          <a:p>
+            <a:br>
               <a:rPr lang="en-US" dirty="0"/>
-              <a:t>Step 2 : Optimization algorithm (greedy learner)</a:t>
-            </a:r>
+            </a:br>
             <a:endParaRPr lang="it-IT" dirty="0"/>
-          </a:p>
-        </p:txBody>
-      </p:sp>
-      <p:sp>
-        <p:nvSpPr>
-          <p:cNvPr id="3" name="Content Placeholder 2">
-            <a:extLst>
-              <a:ext uri="{FF2B5EF4-FFF2-40B4-BE49-F238E27FC236}">
-                <a16:creationId xmlns:a16="http://schemas.microsoft.com/office/drawing/2014/main" id="{741E2AB6-DBC2-4C24-AE4D-34D9854845F5}"/>
-              </a:ext>
-            </a:extLst>
-          </p:cNvPr>
-          <p:cNvSpPr>
-            <a:spLocks noGrp="1"/>
-          </p:cNvSpPr>
-          <p:nvPr>
-            <p:ph idx="1"/>
-          </p:nvPr>
-        </p:nvSpPr>
-        <p:spPr/>
-        <p:txBody>
-          <a:bodyPr/>
-          <a:lstStyle/>
-          <a:p>
-            <a:endParaRPr lang="it-IT"/>
           </a:p>
         </p:txBody>
       </p:sp>
     </p:spTree>
     <p:extLst>
       <p:ext uri="{BB962C8B-B14F-4D97-AF65-F5344CB8AC3E}">
-        <p14:creationId xmlns:p14="http://schemas.microsoft.com/office/powerpoint/2010/main" val="147077479"/>
+        <p14:creationId xmlns:p14="http://schemas.microsoft.com/office/powerpoint/2010/main" val="194705878"/>
+      </p:ext>
+    </p:extLst>
+  </p:cSld>
+  <p:clrMapOvr>
+    <a:masterClrMapping/>
+  </p:clrMapOvr>
+</p:sld>
+</file>
+
+<file path=ppt/slides/slide5.xml><?xml version="1.0" encoding="utf-8"?>
+<p:sld xmlns:a="http://schemas.openxmlformats.org/drawingml/2006/main" xmlns:r="http://schemas.openxmlformats.org/officeDocument/2006/relationships" xmlns:p="http://schemas.openxmlformats.org/presentationml/2006/main">
+  <p:cSld>
+    <p:spTree>
+      <p:nvGrpSpPr>
+        <p:cNvPr id="1" name=""/>
+        <p:cNvGrpSpPr/>
+        <p:nvPr/>
+      </p:nvGrpSpPr>
+      <p:grpSpPr>
+        <a:xfrm>
+          <a:off x="0" y="0"/>
+          <a:ext cx="0" cy="0"/>
+          <a:chOff x="0" y="0"/>
+          <a:chExt cx="0" cy="0"/>
+        </a:xfrm>
+      </p:grpSpPr>
+      <p:sp>
+        <p:nvSpPr>
+          <p:cNvPr id="2" name="Title 1">
+            <a:extLst>
+              <a:ext uri="{FF2B5EF4-FFF2-40B4-BE49-F238E27FC236}">
+                <a16:creationId xmlns:a16="http://schemas.microsoft.com/office/drawing/2014/main" id="{C622B3DC-FF34-4ECF-93DA-C95F3FC69881}"/>
+              </a:ext>
+            </a:extLst>
+          </p:cNvPr>
+          <p:cNvSpPr>
+            <a:spLocks noGrp="1"/>
+          </p:cNvSpPr>
+          <p:nvPr>
+            <p:ph type="title"/>
+          </p:nvPr>
+        </p:nvSpPr>
+        <p:spPr/>
+        <p:txBody>
+          <a:bodyPr/>
+          <a:lstStyle/>
+          <a:p>
+            <a:endParaRPr lang="it-IT"/>
+          </a:p>
+        </p:txBody>
+      </p:sp>
+      <p:sp>
+        <p:nvSpPr>
+          <p:cNvPr id="3" name="Content Placeholder 2">
+            <a:extLst>
+              <a:ext uri="{FF2B5EF4-FFF2-40B4-BE49-F238E27FC236}">
+                <a16:creationId xmlns:a16="http://schemas.microsoft.com/office/drawing/2014/main" id="{D16A455B-7B8F-4220-AB85-8784EF02DA8C}"/>
+              </a:ext>
+            </a:extLst>
+          </p:cNvPr>
+          <p:cNvSpPr>
+            <a:spLocks noGrp="1"/>
+          </p:cNvSpPr>
+          <p:nvPr>
+            <p:ph idx="1"/>
+          </p:nvPr>
+        </p:nvSpPr>
+        <p:spPr/>
+        <p:txBody>
+          <a:bodyPr/>
+          <a:lstStyle/>
+          <a:p>
+            <a:pPr algn="just" rtl="0">
+              <a:spcBef>
+                <a:spcPts val="0"/>
+              </a:spcBef>
+              <a:spcAft>
+                <a:spcPts val="0"/>
+              </a:spcAft>
+            </a:pPr>
+            <a:r>
+              <a:rPr lang="en-US" sz="1800" b="0" i="0" u="none" strike="noStrike" dirty="0">
+                <a:solidFill>
+                  <a:srgbClr val="000000"/>
+                </a:solidFill>
+                <a:effectLst/>
+                <a:latin typeface="Arial" panose="020B0604020202020204" pitchFamily="34" charset="0"/>
+              </a:rPr>
+              <a:t>In the following project proposals, we ask you to develop two different settings differing for the graph weights. First, assume that the graph is fully connected and therefore all the edges have strictly positive probabilities (in practice the secondary products displayed are just two and thus many of the edges are useless). In the second, assume that the graph is not fully connected and therefore some edges have zero probability. </a:t>
+            </a:r>
+            <a:endParaRPr lang="en-US" b="0" dirty="0">
+              <a:effectLst/>
+            </a:endParaRPr>
+          </a:p>
+          <a:p>
+            <a:pPr algn="just" rtl="0">
+              <a:spcBef>
+                <a:spcPts val="0"/>
+              </a:spcBef>
+              <a:spcAft>
+                <a:spcPts val="0"/>
+              </a:spcAft>
+            </a:pPr>
+            <a:br>
+              <a:rPr lang="en-US" b="0" dirty="0">
+                <a:effectLst/>
+              </a:rPr>
+            </a:br>
+            <a:r>
+              <a:rPr lang="en-US" sz="1800" b="0" i="0" u="none" strike="noStrike" dirty="0">
+                <a:solidFill>
+                  <a:srgbClr val="000000"/>
+                </a:solidFill>
+                <a:effectLst/>
+                <a:latin typeface="Arial" panose="020B0604020202020204" pitchFamily="34" charset="0"/>
+              </a:rPr>
+              <a:t>The behavior of the user in the graph is similar to that of the social influence. Thus, in the following project proposals, you need to resort to social influence techniques to evaluate the probabilities with which the user reaches the webpage with some specific primary product.</a:t>
+            </a:r>
+            <a:endParaRPr lang="en-US" b="0" dirty="0">
+              <a:effectLst/>
+            </a:endParaRPr>
+          </a:p>
+          <a:p>
+            <a:br>
+              <a:rPr lang="en-US" dirty="0"/>
+            </a:br>
+            <a:endParaRPr lang="it-IT" dirty="0"/>
+          </a:p>
+        </p:txBody>
+      </p:sp>
+    </p:spTree>
+    <p:extLst>
+      <p:ext uri="{BB962C8B-B14F-4D97-AF65-F5344CB8AC3E}">
+        <p14:creationId xmlns:p14="http://schemas.microsoft.com/office/powerpoint/2010/main" val="3485025798"/>
+      </p:ext>
+    </p:extLst>
+  </p:cSld>
+  <p:clrMapOvr>
+    <a:masterClrMapping/>
+  </p:clrMapOvr>
+</p:sld>
+</file>
+
+<file path=ppt/slides/slide6.xml><?xml version="1.0" encoding="utf-8"?>
+<p:sld xmlns:a="http://schemas.openxmlformats.org/drawingml/2006/main" xmlns:r="http://schemas.openxmlformats.org/officeDocument/2006/relationships" xmlns:p="http://schemas.openxmlformats.org/presentationml/2006/main">
+  <p:cSld>
+    <p:spTree>
+      <p:nvGrpSpPr>
+        <p:cNvPr id="1" name=""/>
+        <p:cNvGrpSpPr/>
+        <p:nvPr/>
+      </p:nvGrpSpPr>
+      <p:grpSpPr>
+        <a:xfrm>
+          <a:off x="0" y="0"/>
+          <a:ext cx="0" cy="0"/>
+          <a:chOff x="0" y="0"/>
+          <a:chExt cx="0" cy="0"/>
+        </a:xfrm>
+      </p:grpSpPr>
+      <p:sp>
+        <p:nvSpPr>
+          <p:cNvPr id="2" name="Title 1">
+            <a:extLst>
+              <a:ext uri="{FF2B5EF4-FFF2-40B4-BE49-F238E27FC236}">
+                <a16:creationId xmlns:a16="http://schemas.microsoft.com/office/drawing/2014/main" id="{7A3FD5BB-2CA2-446E-9CDA-1841C59BE6A1}"/>
+              </a:ext>
+            </a:extLst>
+          </p:cNvPr>
+          <p:cNvSpPr>
+            <a:spLocks noGrp="1"/>
+          </p:cNvSpPr>
+          <p:nvPr>
+            <p:ph type="title"/>
+          </p:nvPr>
+        </p:nvSpPr>
+        <p:spPr/>
+        <p:txBody>
+          <a:bodyPr/>
+          <a:lstStyle/>
+          <a:p>
+            <a:endParaRPr lang="it-IT"/>
+          </a:p>
+        </p:txBody>
+      </p:sp>
+      <p:sp>
+        <p:nvSpPr>
+          <p:cNvPr id="3" name="Content Placeholder 2">
+            <a:extLst>
+              <a:ext uri="{FF2B5EF4-FFF2-40B4-BE49-F238E27FC236}">
+                <a16:creationId xmlns:a16="http://schemas.microsoft.com/office/drawing/2014/main" id="{1729431B-A04B-4C88-B96F-B1FFE28C1C41}"/>
+              </a:ext>
+            </a:extLst>
+          </p:cNvPr>
+          <p:cNvSpPr>
+            <a:spLocks noGrp="1"/>
+          </p:cNvSpPr>
+          <p:nvPr>
+            <p:ph idx="1"/>
+          </p:nvPr>
+        </p:nvSpPr>
+        <p:spPr/>
+        <p:txBody>
+          <a:bodyPr/>
+          <a:lstStyle/>
+          <a:p>
+            <a:pPr algn="just" rtl="0">
+              <a:spcBef>
+                <a:spcPts val="0"/>
+              </a:spcBef>
+              <a:spcAft>
+                <a:spcPts val="0"/>
+              </a:spcAft>
+            </a:pPr>
+            <a:r>
+              <a:rPr lang="en-US" sz="1800" b="0" i="0" u="none" strike="noStrike" dirty="0">
+                <a:solidFill>
+                  <a:srgbClr val="000000"/>
+                </a:solidFill>
+                <a:effectLst/>
+                <a:latin typeface="Arial" panose="020B0604020202020204" pitchFamily="34" charset="0"/>
+              </a:rPr>
+              <a:t>Consider the scenario in which:</a:t>
+            </a:r>
+            <a:endParaRPr lang="en-US" b="0" dirty="0">
+              <a:effectLst/>
+            </a:endParaRPr>
+          </a:p>
+          <a:p>
+            <a:pPr algn="just" rtl="0" fontAlgn="base">
+              <a:spcBef>
+                <a:spcPts val="0"/>
+              </a:spcBef>
+              <a:spcAft>
+                <a:spcPts val="0"/>
+              </a:spcAft>
+              <a:buFont typeface="Arial" panose="020B0604020202020204" pitchFamily="34" charset="0"/>
+              <a:buChar char="•"/>
+            </a:pPr>
+            <a:br>
+              <a:rPr lang="en-US" b="0" dirty="0">
+                <a:effectLst/>
+              </a:rPr>
+            </a:br>
+            <a:r>
+              <a:rPr lang="en-US" sz="1800" b="0" i="0" u="none" strike="noStrike" dirty="0">
+                <a:solidFill>
+                  <a:srgbClr val="000000"/>
+                </a:solidFill>
+                <a:effectLst/>
+                <a:latin typeface="Arial" panose="020B0604020202020204" pitchFamily="34" charset="0"/>
+              </a:rPr>
+              <a:t>for every primary product, the pair and the order of the secondary products to display is fixed by the business unit and cannot be controlled,</a:t>
+            </a:r>
+          </a:p>
+          <a:p>
+            <a:pPr algn="just" rtl="0" fontAlgn="base">
+              <a:spcBef>
+                <a:spcPts val="0"/>
+              </a:spcBef>
+              <a:spcAft>
+                <a:spcPts val="0"/>
+              </a:spcAft>
+              <a:buFont typeface="Arial" panose="020B0604020202020204" pitchFamily="34" charset="0"/>
+              <a:buChar char="•"/>
+            </a:pPr>
+            <a:r>
+              <a:rPr lang="en-US" sz="1800" b="0" i="0" u="none" strike="noStrike" dirty="0">
+                <a:solidFill>
+                  <a:srgbClr val="000000"/>
+                </a:solidFill>
+                <a:effectLst/>
+                <a:latin typeface="Arial" panose="020B0604020202020204" pitchFamily="34" charset="0"/>
+              </a:rPr>
+              <a:t>the price of every primary product is a variable to optimize,</a:t>
+            </a:r>
+          </a:p>
+          <a:p>
+            <a:pPr algn="just" rtl="0" fontAlgn="base">
+              <a:spcBef>
+                <a:spcPts val="0"/>
+              </a:spcBef>
+              <a:spcAft>
+                <a:spcPts val="0"/>
+              </a:spcAft>
+              <a:buFont typeface="Arial" panose="020B0604020202020204" pitchFamily="34" charset="0"/>
+              <a:buChar char="•"/>
+            </a:pPr>
+            <a:r>
+              <a:rPr lang="en-US" sz="1800" b="0" i="0" u="none" strike="noStrike" dirty="0">
+                <a:solidFill>
+                  <a:srgbClr val="000000"/>
+                </a:solidFill>
+                <a:effectLst/>
+                <a:latin typeface="Arial" panose="020B0604020202020204" pitchFamily="34" charset="0"/>
+              </a:rPr>
+              <a:t>the expected values of the 𝛼 ratios are known.</a:t>
+            </a:r>
+          </a:p>
+          <a:p>
+            <a:pPr algn="just" rtl="0">
+              <a:spcBef>
+                <a:spcPts val="0"/>
+              </a:spcBef>
+              <a:spcAft>
+                <a:spcPts val="0"/>
+              </a:spcAft>
+            </a:pPr>
+            <a:br>
+              <a:rPr lang="en-US" b="0" dirty="0">
+                <a:effectLst/>
+              </a:rPr>
+            </a:br>
+            <a:r>
+              <a:rPr lang="en-US" sz="1800" b="0" i="0" u="none" strike="noStrike" dirty="0">
+                <a:solidFill>
+                  <a:srgbClr val="000000"/>
+                </a:solidFill>
+                <a:effectLst/>
+                <a:latin typeface="Arial" panose="020B0604020202020204" pitchFamily="34" charset="0"/>
+              </a:rPr>
+              <a:t>For simplicity, assume that there are four values of price for every product and that the price can be changed once a day. For every product, order the prices in increasing levels. Every price is associated with a known margin. On the other hand, for every product, the conversion probability associated with each price value is a random variable whose mean is unknown. </a:t>
+            </a:r>
+            <a:endParaRPr lang="en-US" b="0" dirty="0">
+              <a:effectLst/>
+            </a:endParaRPr>
+          </a:p>
+          <a:p>
+            <a:br>
+              <a:rPr lang="en-US" dirty="0"/>
+            </a:br>
+            <a:endParaRPr lang="it-IT" dirty="0"/>
+          </a:p>
+        </p:txBody>
+      </p:sp>
+    </p:spTree>
+    <p:extLst>
+      <p:ext uri="{BB962C8B-B14F-4D97-AF65-F5344CB8AC3E}">
+        <p14:creationId xmlns:p14="http://schemas.microsoft.com/office/powerpoint/2010/main" val="1384759136"/>
+      </p:ext>
+    </p:extLst>
+  </p:cSld>
+  <p:clrMapOvr>
+    <a:masterClrMapping/>
+  </p:clrMapOvr>
+</p:sld>
+</file>
+
+<file path=ppt/slides/slide7.xml><?xml version="1.0" encoding="utf-8"?>
+<p:sld xmlns:a="http://schemas.openxmlformats.org/drawingml/2006/main" xmlns:r="http://schemas.openxmlformats.org/officeDocument/2006/relationships" xmlns:p="http://schemas.openxmlformats.org/presentationml/2006/main">
+  <p:cSld>
+    <p:spTree>
+      <p:nvGrpSpPr>
+        <p:cNvPr id="1" name=""/>
+        <p:cNvGrpSpPr/>
+        <p:nvPr/>
+      </p:nvGrpSpPr>
+      <p:grpSpPr>
+        <a:xfrm>
+          <a:off x="0" y="0"/>
+          <a:ext cx="0" cy="0"/>
+          <a:chOff x="0" y="0"/>
+          <a:chExt cx="0" cy="0"/>
+        </a:xfrm>
+      </p:grpSpPr>
+      <p:sp>
+        <p:nvSpPr>
+          <p:cNvPr id="2" name="Title 1">
+            <a:extLst>
+              <a:ext uri="{FF2B5EF4-FFF2-40B4-BE49-F238E27FC236}">
+                <a16:creationId xmlns:a16="http://schemas.microsoft.com/office/drawing/2014/main" id="{78EA82CA-FB1C-451D-92C5-DC9D90D38F8B}"/>
+              </a:ext>
+            </a:extLst>
+          </p:cNvPr>
+          <p:cNvSpPr>
+            <a:spLocks noGrp="1"/>
+          </p:cNvSpPr>
+          <p:nvPr>
+            <p:ph type="title"/>
+          </p:nvPr>
+        </p:nvSpPr>
+        <p:spPr/>
+        <p:txBody>
+          <a:bodyPr/>
+          <a:lstStyle/>
+          <a:p>
+            <a:endParaRPr lang="it-IT"/>
+          </a:p>
+        </p:txBody>
+      </p:sp>
+      <p:sp>
+        <p:nvSpPr>
+          <p:cNvPr id="3" name="Content Placeholder 2">
+            <a:extLst>
+              <a:ext uri="{FF2B5EF4-FFF2-40B4-BE49-F238E27FC236}">
+                <a16:creationId xmlns:a16="http://schemas.microsoft.com/office/drawing/2014/main" id="{99C7ECA6-E451-4D5E-8A69-72671A63C204}"/>
+              </a:ext>
+            </a:extLst>
+          </p:cNvPr>
+          <p:cNvSpPr>
+            <a:spLocks noGrp="1"/>
+          </p:cNvSpPr>
+          <p:nvPr>
+            <p:ph idx="1"/>
+          </p:nvPr>
+        </p:nvSpPr>
+        <p:spPr/>
+        <p:txBody>
+          <a:bodyPr/>
+          <a:lstStyle/>
+          <a:p>
+            <a:pPr algn="just" rtl="0">
+              <a:spcBef>
+                <a:spcPts val="0"/>
+              </a:spcBef>
+              <a:spcAft>
+                <a:spcPts val="0"/>
+              </a:spcAft>
+            </a:pPr>
+            <a:r>
+              <a:rPr lang="en-US" sz="1800" b="0" i="1" u="none" strike="noStrike" dirty="0">
+                <a:solidFill>
+                  <a:srgbClr val="000000"/>
+                </a:solidFill>
+                <a:effectLst/>
+                <a:latin typeface="Arial" panose="020B0604020202020204" pitchFamily="34" charset="0"/>
+              </a:rPr>
+              <a:t>Step 1: Environment. </a:t>
+            </a:r>
+            <a:r>
+              <a:rPr lang="en-US" sz="1800" b="0" i="0" u="none" strike="noStrike" dirty="0">
+                <a:solidFill>
+                  <a:srgbClr val="000000"/>
+                </a:solidFill>
+                <a:effectLst/>
+                <a:latin typeface="Arial" panose="020B0604020202020204" pitchFamily="34" charset="0"/>
+              </a:rPr>
+              <a:t>Develop the simulator by Python. In doing that, imagine a motivating application and specify an opportune choice of the probability distributions associated with every random variable. Moreover, assume that there are 2 binary features that define 3 different user classes. The users’ classes potentially differ for the demand curves of the 5 products, number of daily users, 𝛼 ratios, number of products sold, and graph probabilities. That is, for every random variable, you need to provide three different distributions, each one corresponding to a different users’ class.</a:t>
+            </a:r>
+            <a:endParaRPr lang="en-US" b="0" dirty="0">
+              <a:effectLst/>
+            </a:endParaRPr>
+          </a:p>
+        </p:txBody>
+      </p:sp>
+    </p:spTree>
+    <p:extLst>
+      <p:ext uri="{BB962C8B-B14F-4D97-AF65-F5344CB8AC3E}">
+        <p14:creationId xmlns:p14="http://schemas.microsoft.com/office/powerpoint/2010/main" val="1501144360"/>
+      </p:ext>
+    </p:extLst>
+  </p:cSld>
+  <p:clrMapOvr>
+    <a:masterClrMapping/>
+  </p:clrMapOvr>
+</p:sld>
+</file>
+
+<file path=ppt/slides/slide8.xml><?xml version="1.0" encoding="utf-8"?>
+<p:sld xmlns:a="http://schemas.openxmlformats.org/drawingml/2006/main" xmlns:r="http://schemas.openxmlformats.org/officeDocument/2006/relationships" xmlns:p="http://schemas.openxmlformats.org/presentationml/2006/main">
+  <p:cSld>
+    <p:spTree>
+      <p:nvGrpSpPr>
+        <p:cNvPr id="1" name=""/>
+        <p:cNvGrpSpPr/>
+        <p:nvPr/>
+      </p:nvGrpSpPr>
+      <p:grpSpPr>
+        <a:xfrm>
+          <a:off x="0" y="0"/>
+          <a:ext cx="0" cy="0"/>
+          <a:chOff x="0" y="0"/>
+          <a:chExt cx="0" cy="0"/>
+        </a:xfrm>
+      </p:grpSpPr>
+      <p:sp>
+        <p:nvSpPr>
+          <p:cNvPr id="2" name="Title 1">
+            <a:extLst>
+              <a:ext uri="{FF2B5EF4-FFF2-40B4-BE49-F238E27FC236}">
+                <a16:creationId xmlns:a16="http://schemas.microsoft.com/office/drawing/2014/main" id="{48D16E36-38E8-4453-AE2D-FE0B37D4E9BF}"/>
+              </a:ext>
+            </a:extLst>
+          </p:cNvPr>
+          <p:cNvSpPr>
+            <a:spLocks noGrp="1"/>
+          </p:cNvSpPr>
+          <p:nvPr>
+            <p:ph type="title"/>
+          </p:nvPr>
+        </p:nvSpPr>
+        <p:spPr/>
+        <p:txBody>
+          <a:bodyPr/>
+          <a:lstStyle/>
+          <a:p>
+            <a:r>
+              <a:rPr lang="en-US" dirty="0"/>
+              <a:t>Step 1 : Environment</a:t>
+            </a:r>
+            <a:endParaRPr lang="it-IT" dirty="0"/>
+          </a:p>
+        </p:txBody>
+      </p:sp>
+      <p:sp>
+        <p:nvSpPr>
+          <p:cNvPr id="3" name="Text Placeholder 2">
+            <a:extLst>
+              <a:ext uri="{FF2B5EF4-FFF2-40B4-BE49-F238E27FC236}">
+                <a16:creationId xmlns:a16="http://schemas.microsoft.com/office/drawing/2014/main" id="{D8D66A2C-76E2-4F93-A571-3C6669CD4EE6}"/>
+              </a:ext>
+            </a:extLst>
+          </p:cNvPr>
+          <p:cNvSpPr>
+            <a:spLocks noGrp="1"/>
+          </p:cNvSpPr>
+          <p:nvPr>
+            <p:ph type="body" idx="1"/>
+          </p:nvPr>
+        </p:nvSpPr>
+        <p:spPr/>
+        <p:txBody>
+          <a:bodyPr/>
+          <a:lstStyle/>
+          <a:p>
+            <a:endParaRPr lang="it-IT"/>
+          </a:p>
+        </p:txBody>
+      </p:sp>
+    </p:spTree>
+    <p:extLst>
+      <p:ext uri="{BB962C8B-B14F-4D97-AF65-F5344CB8AC3E}">
+        <p14:creationId xmlns:p14="http://schemas.microsoft.com/office/powerpoint/2010/main" val="3337437340"/>
+      </p:ext>
+    </p:extLst>
+  </p:cSld>
+  <p:clrMapOvr>
+    <a:masterClrMapping/>
+  </p:clrMapOvr>
+</p:sld>
+</file>
+
+<file path=ppt/slides/slide9.xml><?xml version="1.0" encoding="utf-8"?>
+<p:sld xmlns:a="http://schemas.openxmlformats.org/drawingml/2006/main" xmlns:r="http://schemas.openxmlformats.org/officeDocument/2006/relationships" xmlns:p="http://schemas.openxmlformats.org/presentationml/2006/main">
+  <p:cSld>
+    <p:spTree>
+      <p:nvGrpSpPr>
+        <p:cNvPr id="1" name=""/>
+        <p:cNvGrpSpPr/>
+        <p:nvPr/>
+      </p:nvGrpSpPr>
+      <p:grpSpPr>
+        <a:xfrm>
+          <a:off x="0" y="0"/>
+          <a:ext cx="0" cy="0"/>
+          <a:chOff x="0" y="0"/>
+          <a:chExt cx="0" cy="0"/>
+        </a:xfrm>
+      </p:grpSpPr>
+      <p:sp>
+        <p:nvSpPr>
+          <p:cNvPr id="2" name="Title 1">
+            <a:extLst>
+              <a:ext uri="{FF2B5EF4-FFF2-40B4-BE49-F238E27FC236}">
+                <a16:creationId xmlns:a16="http://schemas.microsoft.com/office/drawing/2014/main" id="{81EF4448-BDBE-429C-BDDD-6E410B431A0C}"/>
+              </a:ext>
+            </a:extLst>
+          </p:cNvPr>
+          <p:cNvSpPr>
+            <a:spLocks noGrp="1"/>
+          </p:cNvSpPr>
+          <p:nvPr>
+            <p:ph type="title"/>
+          </p:nvPr>
+        </p:nvSpPr>
+        <p:spPr/>
+        <p:txBody>
+          <a:bodyPr/>
+          <a:lstStyle/>
+          <a:p>
+            <a:r>
+              <a:rPr lang="en-US" sz="4400" dirty="0">
+                <a:solidFill>
+                  <a:srgbClr val="000000"/>
+                </a:solidFill>
+                <a:latin typeface="Arial" panose="020B0604020202020204" pitchFamily="34" charset="0"/>
+              </a:rPr>
+              <a:t>A</a:t>
+            </a:r>
+            <a:r>
+              <a:rPr lang="en-US" sz="4400" b="0" i="0" u="none" strike="noStrike" dirty="0">
+                <a:solidFill>
+                  <a:srgbClr val="000000"/>
+                </a:solidFill>
+                <a:effectLst/>
+                <a:latin typeface="Arial" panose="020B0604020202020204" pitchFamily="34" charset="0"/>
+              </a:rPr>
+              <a:t> motivating application</a:t>
+            </a:r>
+            <a:endParaRPr lang="it-IT" dirty="0"/>
+          </a:p>
+        </p:txBody>
+      </p:sp>
+      <p:sp>
+        <p:nvSpPr>
+          <p:cNvPr id="3" name="Content Placeholder 2">
+            <a:extLst>
+              <a:ext uri="{FF2B5EF4-FFF2-40B4-BE49-F238E27FC236}">
+                <a16:creationId xmlns:a16="http://schemas.microsoft.com/office/drawing/2014/main" id="{8B6C581B-EBD2-4B22-81D7-3E4EA42F5D29}"/>
+              </a:ext>
+            </a:extLst>
+          </p:cNvPr>
+          <p:cNvSpPr>
+            <a:spLocks noGrp="1"/>
+          </p:cNvSpPr>
+          <p:nvPr>
+            <p:ph idx="1"/>
+          </p:nvPr>
+        </p:nvSpPr>
+        <p:spPr/>
+        <p:txBody>
+          <a:bodyPr/>
+          <a:lstStyle/>
+          <a:p>
+            <a:r>
+              <a:rPr lang="en-US" dirty="0"/>
+              <a:t>5 different products</a:t>
+            </a:r>
+          </a:p>
+          <a:p>
+            <a:r>
+              <a:rPr lang="en-US" dirty="0"/>
+              <a:t>Sold on a website</a:t>
+            </a:r>
+            <a:endParaRPr lang="it-IT" dirty="0"/>
+          </a:p>
+        </p:txBody>
+      </p:sp>
+    </p:spTree>
+    <p:extLst>
+      <p:ext uri="{BB962C8B-B14F-4D97-AF65-F5344CB8AC3E}">
+        <p14:creationId xmlns:p14="http://schemas.microsoft.com/office/powerpoint/2010/main" val="535354618"/>
       </p:ext>
     </p:extLst>
   </p:cSld>

</xml_diff>